<commit_message>
Updated pixel size of power point slides to match appsource storage requirement
</commit_message>
<xml_diff>
--- a/docs/ImagePresentation.pptx
+++ b/docs/ImagePresentation.pptx
@@ -2,14 +2,14 @@
 <file path=ppt/presentation.xml><?xml version="1.0" encoding="utf-8"?>
 <p:presentation xmlns:a="http://schemas.openxmlformats.org/drawingml/2006/main" xmlns:r="http://schemas.openxmlformats.org/officeDocument/2006/relationships" xmlns:p="http://schemas.openxmlformats.org/presentationml/2006/main" saveSubsetFonts="1">
   <p:sldMasterIdLst>
-    <p:sldMasterId id="2147483672" r:id="rId1"/>
+    <p:sldMasterId id="2147483690" r:id="rId1"/>
   </p:sldMasterIdLst>
   <p:sldIdLst>
     <p:sldId id="256" r:id="rId2"/>
     <p:sldId id="257" r:id="rId3"/>
     <p:sldId id="258" r:id="rId4"/>
   </p:sldIdLst>
-  <p:sldSz cx="12192000" cy="6858000"/>
+  <p:sldSz cx="13011150" cy="7315200"/>
   <p:notesSz cx="6858000" cy="9144000"/>
   <p:defaultTextStyle>
     <a:defPPr>
@@ -143,8 +143,8 @@
         </p:nvSpPr>
         <p:spPr>
           <a:xfrm>
-            <a:off x="684212" y="685799"/>
-            <a:ext cx="8001000" cy="2971801"/>
+            <a:off x="730183" y="731520"/>
+            <a:ext cx="8538567" cy="3169921"/>
           </a:xfrm>
         </p:spPr>
         <p:txBody>
@@ -153,7 +153,7 @@
           </a:bodyPr>
           <a:lstStyle>
             <a:lvl1pPr algn="l">
-              <a:defRPr sz="4800">
+              <a:defRPr sz="5120">
                 <a:effectLst/>
               </a:defRPr>
             </a:lvl1pPr>
@@ -179,8 +179,8 @@
         </p:nvSpPr>
         <p:spPr>
           <a:xfrm>
-            <a:off x="684212" y="3843867"/>
-            <a:ext cx="6400800" cy="1947333"/>
+            <a:off x="730182" y="4100125"/>
+            <a:ext cx="6830854" cy="2077155"/>
           </a:xfrm>
         </p:spPr>
         <p:txBody>
@@ -190,7 +190,7 @@
           <a:lstStyle>
             <a:lvl1pPr marL="0" indent="0" algn="l">
               <a:buNone/>
-              <a:defRPr sz="2100">
+              <a:defRPr sz="2240">
                 <a:solidFill>
                   <a:schemeClr val="bg2">
                     <a:lumMod val="75000"/>
@@ -198,7 +198,7 @@
                 </a:solidFill>
               </a:defRPr>
             </a:lvl1pPr>
-            <a:lvl2pPr marL="457200" indent="0" algn="ctr">
+            <a:lvl2pPr marL="487695" indent="0" algn="ctr">
               <a:buNone/>
               <a:defRPr>
                 <a:solidFill>
@@ -208,7 +208,7 @@
                 </a:solidFill>
               </a:defRPr>
             </a:lvl2pPr>
-            <a:lvl3pPr marL="914400" indent="0" algn="ctr">
+            <a:lvl3pPr marL="975390" indent="0" algn="ctr">
               <a:buNone/>
               <a:defRPr>
                 <a:solidFill>
@@ -218,7 +218,7 @@
                 </a:solidFill>
               </a:defRPr>
             </a:lvl3pPr>
-            <a:lvl4pPr marL="1371600" indent="0" algn="ctr">
+            <a:lvl4pPr marL="1463086" indent="0" algn="ctr">
               <a:buNone/>
               <a:defRPr>
                 <a:solidFill>
@@ -228,7 +228,7 @@
                 </a:solidFill>
               </a:defRPr>
             </a:lvl4pPr>
-            <a:lvl5pPr marL="1828800" indent="0" algn="ctr">
+            <a:lvl5pPr marL="1950781" indent="0" algn="ctr">
               <a:buNone/>
               <a:defRPr>
                 <a:solidFill>
@@ -238,7 +238,7 @@
                 </a:solidFill>
               </a:defRPr>
             </a:lvl5pPr>
-            <a:lvl6pPr marL="2286000" indent="0" algn="ctr">
+            <a:lvl6pPr marL="2438476" indent="0" algn="ctr">
               <a:buNone/>
               <a:defRPr>
                 <a:solidFill>
@@ -248,7 +248,7 @@
                 </a:solidFill>
               </a:defRPr>
             </a:lvl6pPr>
-            <a:lvl7pPr marL="2743200" indent="0" algn="ctr">
+            <a:lvl7pPr marL="2926171" indent="0" algn="ctr">
               <a:buNone/>
               <a:defRPr>
                 <a:solidFill>
@@ -258,7 +258,7 @@
                 </a:solidFill>
               </a:defRPr>
             </a:lvl7pPr>
-            <a:lvl8pPr marL="3200400" indent="0" algn="ctr">
+            <a:lvl8pPr marL="3413867" indent="0" algn="ctr">
               <a:buNone/>
               <a:defRPr>
                 <a:solidFill>
@@ -268,7 +268,7 @@
                 </a:solidFill>
               </a:defRPr>
             </a:lvl8pPr>
-            <a:lvl9pPr marL="3657600" indent="0" algn="ctr">
+            <a:lvl9pPr marL="3901562" indent="0" algn="ctr">
               <a:buNone/>
               <a:defRPr>
                 <a:solidFill>
@@ -305,7 +305,7 @@
           <a:p>
             <a:fld id="{E1A07225-5EC2-4FE8-BBD7-4A2ABB88F5AE}" type="datetimeFigureOut">
               <a:rPr lang="de-DE" smtClean="0"/>
-              <a:t>29.04.2022</a:t>
+              <a:t>05.05.2022</a:t>
             </a:fld>
             <a:endParaRPr lang="de-DE" dirty="0"/>
           </a:p>
@@ -361,8 +361,8 @@
         </p:nvCxnSpPr>
         <p:spPr>
           <a:xfrm flipH="1">
-            <a:off x="8228012" y="8467"/>
-            <a:ext cx="3810000" cy="3810000"/>
+            <a:off x="8780832" y="9031"/>
+            <a:ext cx="4065984" cy="4064000"/>
           </a:xfrm>
           <a:prstGeom prst="line">
             <a:avLst/>
@@ -396,8 +396,8 @@
         </p:nvCxnSpPr>
         <p:spPr>
           <a:xfrm flipH="1">
-            <a:off x="6108170" y="91545"/>
-            <a:ext cx="6080655" cy="6080655"/>
+            <a:off x="6518563" y="97649"/>
+            <a:ext cx="6489199" cy="6486032"/>
           </a:xfrm>
           <a:prstGeom prst="line">
             <a:avLst/>
@@ -431,8 +431,8 @@
         </p:nvCxnSpPr>
         <p:spPr>
           <a:xfrm flipH="1">
-            <a:off x="7235825" y="228600"/>
-            <a:ext cx="4953000" cy="4953000"/>
+            <a:off x="7721982" y="243840"/>
+            <a:ext cx="5285780" cy="5283200"/>
           </a:xfrm>
           <a:prstGeom prst="line">
             <a:avLst/>
@@ -466,8 +466,8 @@
         </p:nvCxnSpPr>
         <p:spPr>
           <a:xfrm flipH="1">
-            <a:off x="7335837" y="32278"/>
-            <a:ext cx="4852989" cy="4852989"/>
+            <a:off x="7828714" y="34430"/>
+            <a:ext cx="5179049" cy="5176522"/>
           </a:xfrm>
           <a:prstGeom prst="line">
             <a:avLst/>
@@ -501,8 +501,8 @@
         </p:nvCxnSpPr>
         <p:spPr>
           <a:xfrm flipH="1">
-            <a:off x="7845426" y="609601"/>
-            <a:ext cx="4343399" cy="4343399"/>
+            <a:off x="8372541" y="650242"/>
+            <a:ext cx="4635221" cy="4632959"/>
           </a:xfrm>
           <a:prstGeom prst="line">
             <a:avLst/>
@@ -531,7 +531,7 @@
     </p:spTree>
     <p:extLst>
       <p:ext uri="{BB962C8B-B14F-4D97-AF65-F5344CB8AC3E}">
-        <p14:creationId xmlns:p14="http://schemas.microsoft.com/office/powerpoint/2010/main" val="1139752182"/>
+        <p14:creationId xmlns:p14="http://schemas.microsoft.com/office/powerpoint/2010/main" val="2176314032"/>
       </p:ext>
     </p:extLst>
   </p:cSld>
@@ -593,8 +593,8 @@
         </p:nvSpPr>
         <p:spPr>
           <a:xfrm>
-            <a:off x="685800" y="533400"/>
-            <a:ext cx="10818812" cy="3124200"/>
+            <a:off x="731877" y="568960"/>
+            <a:ext cx="11545701" cy="3332480"/>
           </a:xfrm>
           <a:prstGeom prst="snip2DiagRect">
             <a:avLst>
@@ -624,39 +624,39 @@
           <a:lstStyle>
             <a:lvl1pPr marL="0" indent="0" algn="ctr">
               <a:buNone/>
-              <a:defRPr sz="1600"/>
+              <a:defRPr sz="1707"/>
             </a:lvl1pPr>
-            <a:lvl2pPr marL="457200" indent="0">
-              <a:buNone/>
-              <a:defRPr sz="1600"/>
+            <a:lvl2pPr marL="487695" indent="0">
+              <a:buNone/>
+              <a:defRPr sz="1707"/>
             </a:lvl2pPr>
-            <a:lvl3pPr marL="914400" indent="0">
-              <a:buNone/>
-              <a:defRPr sz="1600"/>
+            <a:lvl3pPr marL="975390" indent="0">
+              <a:buNone/>
+              <a:defRPr sz="1707"/>
             </a:lvl3pPr>
-            <a:lvl4pPr marL="1371600" indent="0">
-              <a:buNone/>
-              <a:defRPr sz="1600"/>
+            <a:lvl4pPr marL="1463086" indent="0">
+              <a:buNone/>
+              <a:defRPr sz="1707"/>
             </a:lvl4pPr>
-            <a:lvl5pPr marL="1828800" indent="0">
-              <a:buNone/>
-              <a:defRPr sz="1600"/>
+            <a:lvl5pPr marL="1950781" indent="0">
+              <a:buNone/>
+              <a:defRPr sz="1707"/>
             </a:lvl5pPr>
-            <a:lvl6pPr marL="2286000" indent="0">
-              <a:buNone/>
-              <a:defRPr sz="1600"/>
+            <a:lvl6pPr marL="2438476" indent="0">
+              <a:buNone/>
+              <a:defRPr sz="1707"/>
             </a:lvl6pPr>
-            <a:lvl7pPr marL="2743200" indent="0">
-              <a:buNone/>
-              <a:defRPr sz="1600"/>
+            <a:lvl7pPr marL="2926171" indent="0">
+              <a:buNone/>
+              <a:defRPr sz="1707"/>
             </a:lvl7pPr>
-            <a:lvl8pPr marL="3200400" indent="0">
-              <a:buNone/>
-              <a:defRPr sz="1600"/>
+            <a:lvl8pPr marL="3413867" indent="0">
+              <a:buNone/>
+              <a:defRPr sz="1707"/>
             </a:lvl8pPr>
-            <a:lvl9pPr marL="3657600" indent="0">
-              <a:buNone/>
-              <a:defRPr sz="1600"/>
+            <a:lvl9pPr marL="3901562" indent="0">
+              <a:buNone/>
+              <a:defRPr sz="1707"/>
             </a:lvl9pPr>
           </a:lstStyle>
           <a:p>
@@ -680,8 +680,8 @@
         </p:nvSpPr>
         <p:spPr>
           <a:xfrm>
-            <a:off x="914402" y="3843867"/>
-            <a:ext cx="8304210" cy="457200"/>
+            <a:off x="975838" y="4100125"/>
+            <a:ext cx="8862149" cy="487680"/>
           </a:xfrm>
         </p:spPr>
         <p:txBody>
@@ -692,24 +692,24 @@
             <a:lvl1pPr marL="0" indent="0">
               <a:buFontTx/>
               <a:buNone/>
-              <a:defRPr sz="1600"/>
+              <a:defRPr sz="1707"/>
             </a:lvl1pPr>
-            <a:lvl2pPr marL="457200" indent="0">
+            <a:lvl2pPr marL="487695" indent="0">
               <a:buFontTx/>
               <a:buNone/>
               <a:defRPr/>
             </a:lvl2pPr>
-            <a:lvl3pPr marL="914400" indent="0">
+            <a:lvl3pPr marL="975390" indent="0">
               <a:buFontTx/>
               <a:buNone/>
               <a:defRPr/>
             </a:lvl3pPr>
-            <a:lvl4pPr marL="1371600" indent="0">
+            <a:lvl4pPr marL="1463086" indent="0">
               <a:buFontTx/>
               <a:buNone/>
               <a:defRPr/>
             </a:lvl4pPr>
-            <a:lvl5pPr marL="1828800" indent="0">
+            <a:lvl5pPr marL="1950781" indent="0">
               <a:buFontTx/>
               <a:buNone/>
               <a:defRPr/>
@@ -741,7 +741,7 @@
           <a:p>
             <a:fld id="{E1A07225-5EC2-4FE8-BBD7-4A2ABB88F5AE}" type="datetimeFigureOut">
               <a:rPr lang="de-DE" smtClean="0"/>
-              <a:t>29.04.2022</a:t>
+              <a:t>05.05.2022</a:t>
             </a:fld>
             <a:endParaRPr lang="de-DE" dirty="0"/>
           </a:p>
@@ -792,7 +792,7 @@
     </p:spTree>
     <p:extLst>
       <p:ext uri="{BB962C8B-B14F-4D97-AF65-F5344CB8AC3E}">
-        <p14:creationId xmlns:p14="http://schemas.microsoft.com/office/powerpoint/2010/main" val="3794502797"/>
+        <p14:creationId xmlns:p14="http://schemas.microsoft.com/office/powerpoint/2010/main" val="2223700666"/>
       </p:ext>
     </p:extLst>
   </p:cSld>
@@ -831,8 +831,8 @@
         </p:nvSpPr>
         <p:spPr>
           <a:xfrm>
-            <a:off x="684213" y="685800"/>
-            <a:ext cx="10058400" cy="2743200"/>
+            <a:off x="730183" y="731520"/>
+            <a:ext cx="10734199" cy="2926080"/>
           </a:xfrm>
         </p:spPr>
         <p:txBody>
@@ -841,7 +841,7 @@
           </a:bodyPr>
           <a:lstStyle>
             <a:lvl1pPr algn="l">
-              <a:defRPr sz="3200" b="0" cap="all"/>
+              <a:defRPr sz="3413" b="0" cap="all"/>
             </a:lvl1pPr>
           </a:lstStyle>
           <a:p>
@@ -865,8 +865,8 @@
         </p:nvSpPr>
         <p:spPr>
           <a:xfrm>
-            <a:off x="684212" y="4114800"/>
-            <a:ext cx="8535988" cy="1879600"/>
+            <a:off x="730182" y="4389120"/>
+            <a:ext cx="9109500" cy="2004907"/>
           </a:xfrm>
         </p:spPr>
         <p:txBody>
@@ -876,7 +876,7 @@
           <a:lstStyle>
             <a:lvl1pPr marL="0" indent="0" algn="l">
               <a:buNone/>
-              <a:defRPr sz="2000">
+              <a:defRPr sz="2133">
                 <a:solidFill>
                   <a:schemeClr val="bg2">
                     <a:lumMod val="75000"/>
@@ -884,9 +884,9 @@
                 </a:solidFill>
               </a:defRPr>
             </a:lvl1pPr>
-            <a:lvl2pPr marL="457200" indent="0">
-              <a:buNone/>
-              <a:defRPr sz="1800">
+            <a:lvl2pPr marL="487695" indent="0">
+              <a:buNone/>
+              <a:defRPr sz="1920">
                 <a:solidFill>
                   <a:schemeClr val="tx1">
                     <a:tint val="75000"/>
@@ -894,9 +894,9 @@
                 </a:solidFill>
               </a:defRPr>
             </a:lvl2pPr>
-            <a:lvl3pPr marL="914400" indent="0">
-              <a:buNone/>
-              <a:defRPr sz="1600">
+            <a:lvl3pPr marL="975390" indent="0">
+              <a:buNone/>
+              <a:defRPr sz="1707">
                 <a:solidFill>
                   <a:schemeClr val="tx1">
                     <a:tint val="75000"/>
@@ -904,9 +904,9 @@
                 </a:solidFill>
               </a:defRPr>
             </a:lvl3pPr>
-            <a:lvl4pPr marL="1371600" indent="0">
-              <a:buNone/>
-              <a:defRPr sz="1400">
+            <a:lvl4pPr marL="1463086" indent="0">
+              <a:buNone/>
+              <a:defRPr sz="1493">
                 <a:solidFill>
                   <a:schemeClr val="tx1">
                     <a:tint val="75000"/>
@@ -914,9 +914,9 @@
                 </a:solidFill>
               </a:defRPr>
             </a:lvl4pPr>
-            <a:lvl5pPr marL="1828800" indent="0">
-              <a:buNone/>
-              <a:defRPr sz="1400">
+            <a:lvl5pPr marL="1950781" indent="0">
+              <a:buNone/>
+              <a:defRPr sz="1493">
                 <a:solidFill>
                   <a:schemeClr val="tx1">
                     <a:tint val="75000"/>
@@ -924,9 +924,9 @@
                 </a:solidFill>
               </a:defRPr>
             </a:lvl5pPr>
-            <a:lvl6pPr marL="2286000" indent="0">
-              <a:buNone/>
-              <a:defRPr sz="1400">
+            <a:lvl6pPr marL="2438476" indent="0">
+              <a:buNone/>
+              <a:defRPr sz="1493">
                 <a:solidFill>
                   <a:schemeClr val="tx1">
                     <a:tint val="75000"/>
@@ -934,9 +934,9 @@
                 </a:solidFill>
               </a:defRPr>
             </a:lvl6pPr>
-            <a:lvl7pPr marL="2743200" indent="0">
-              <a:buNone/>
-              <a:defRPr sz="1400">
+            <a:lvl7pPr marL="2926171" indent="0">
+              <a:buNone/>
+              <a:defRPr sz="1493">
                 <a:solidFill>
                   <a:schemeClr val="tx1">
                     <a:tint val="75000"/>
@@ -944,9 +944,9 @@
                 </a:solidFill>
               </a:defRPr>
             </a:lvl7pPr>
-            <a:lvl8pPr marL="3200400" indent="0">
-              <a:buNone/>
-              <a:defRPr sz="1400">
+            <a:lvl8pPr marL="3413867" indent="0">
+              <a:buNone/>
+              <a:defRPr sz="1493">
                 <a:solidFill>
                   <a:schemeClr val="tx1">
                     <a:tint val="75000"/>
@@ -954,9 +954,9 @@
                 </a:solidFill>
               </a:defRPr>
             </a:lvl8pPr>
-            <a:lvl9pPr marL="3657600" indent="0">
-              <a:buNone/>
-              <a:defRPr sz="1400">
+            <a:lvl9pPr marL="3901562" indent="0">
+              <a:buNone/>
+              <a:defRPr sz="1493">
                 <a:solidFill>
                   <a:schemeClr val="tx1">
                     <a:tint val="75000"/>
@@ -991,7 +991,7 @@
           <a:p>
             <a:fld id="{E1A07225-5EC2-4FE8-BBD7-4A2ABB88F5AE}" type="datetimeFigureOut">
               <a:rPr lang="de-DE" smtClean="0"/>
-              <a:t>29.04.2022</a:t>
+              <a:t>05.05.2022</a:t>
             </a:fld>
             <a:endParaRPr lang="de-DE" dirty="0"/>
           </a:p>
@@ -1042,7 +1042,7 @@
     </p:spTree>
     <p:extLst>
       <p:ext uri="{BB962C8B-B14F-4D97-AF65-F5344CB8AC3E}">
-        <p14:creationId xmlns:p14="http://schemas.microsoft.com/office/powerpoint/2010/main" val="1188810885"/>
+        <p14:creationId xmlns:p14="http://schemas.microsoft.com/office/powerpoint/2010/main" val="3679947737"/>
       </p:ext>
     </p:extLst>
   </p:cSld>
@@ -1081,8 +1081,8 @@
         </p:nvSpPr>
         <p:spPr>
           <a:xfrm>
-            <a:off x="1141411" y="685800"/>
-            <a:ext cx="9144001" cy="2743200"/>
+            <a:off x="1218100" y="731520"/>
+            <a:ext cx="9758364" cy="2926080"/>
           </a:xfrm>
         </p:spPr>
         <p:txBody>
@@ -1091,7 +1091,7 @@
           </a:bodyPr>
           <a:lstStyle>
             <a:lvl1pPr algn="l">
-              <a:defRPr sz="3200" b="0" cap="all">
+              <a:defRPr sz="3413" b="0" cap="all">
                 <a:solidFill>
                   <a:schemeClr val="tx1"/>
                 </a:solidFill>
@@ -1119,8 +1119,8 @@
         </p:nvSpPr>
         <p:spPr>
           <a:xfrm>
-            <a:off x="1446212" y="3429000"/>
-            <a:ext cx="8534400" cy="381000"/>
+            <a:off x="1543379" y="3657600"/>
+            <a:ext cx="9107805" cy="406400"/>
           </a:xfrm>
         </p:spPr>
         <p:txBody>
@@ -1131,22 +1131,22 @@
               <a:buNone/>
               <a:defRPr/>
             </a:lvl1pPr>
-            <a:lvl2pPr marL="457200" indent="0">
+            <a:lvl2pPr marL="487695" indent="0">
               <a:buFontTx/>
               <a:buNone/>
               <a:defRPr/>
             </a:lvl2pPr>
-            <a:lvl3pPr marL="914400" indent="0">
+            <a:lvl3pPr marL="975390" indent="0">
               <a:buFontTx/>
               <a:buNone/>
               <a:defRPr/>
             </a:lvl3pPr>
-            <a:lvl4pPr marL="1371600" indent="0">
+            <a:lvl4pPr marL="1463086" indent="0">
               <a:buFontTx/>
               <a:buNone/>
               <a:defRPr/>
             </a:lvl4pPr>
-            <a:lvl5pPr marL="1828800" indent="0">
+            <a:lvl5pPr marL="1950781" indent="0">
               <a:buFontTx/>
               <a:buNone/>
               <a:defRPr/>
@@ -1173,8 +1173,8 @@
         </p:nvSpPr>
         <p:spPr>
           <a:xfrm>
-            <a:off x="684213" y="4301067"/>
-            <a:ext cx="8534400" cy="1684865"/>
+            <a:off x="730184" y="4587806"/>
+            <a:ext cx="9107805" cy="1797189"/>
           </a:xfrm>
         </p:spPr>
         <p:txBody>
@@ -1184,7 +1184,7 @@
           <a:lstStyle>
             <a:lvl1pPr marL="0" indent="0" algn="l">
               <a:buNone/>
-              <a:defRPr sz="2000">
+              <a:defRPr sz="2133">
                 <a:solidFill>
                   <a:schemeClr val="bg2">
                     <a:lumMod val="75000"/>
@@ -1192,9 +1192,9 @@
                 </a:solidFill>
               </a:defRPr>
             </a:lvl1pPr>
-            <a:lvl2pPr marL="457200" indent="0">
-              <a:buNone/>
-              <a:defRPr sz="1800">
+            <a:lvl2pPr marL="487695" indent="0">
+              <a:buNone/>
+              <a:defRPr sz="1920">
                 <a:solidFill>
                   <a:schemeClr val="tx1">
                     <a:tint val="75000"/>
@@ -1202,9 +1202,9 @@
                 </a:solidFill>
               </a:defRPr>
             </a:lvl2pPr>
-            <a:lvl3pPr marL="914400" indent="0">
-              <a:buNone/>
-              <a:defRPr sz="1600">
+            <a:lvl3pPr marL="975390" indent="0">
+              <a:buNone/>
+              <a:defRPr sz="1707">
                 <a:solidFill>
                   <a:schemeClr val="tx1">
                     <a:tint val="75000"/>
@@ -1212,9 +1212,9 @@
                 </a:solidFill>
               </a:defRPr>
             </a:lvl3pPr>
-            <a:lvl4pPr marL="1371600" indent="0">
-              <a:buNone/>
-              <a:defRPr sz="1400">
+            <a:lvl4pPr marL="1463086" indent="0">
+              <a:buNone/>
+              <a:defRPr sz="1493">
                 <a:solidFill>
                   <a:schemeClr val="tx1">
                     <a:tint val="75000"/>
@@ -1222,9 +1222,9 @@
                 </a:solidFill>
               </a:defRPr>
             </a:lvl4pPr>
-            <a:lvl5pPr marL="1828800" indent="0">
-              <a:buNone/>
-              <a:defRPr sz="1400">
+            <a:lvl5pPr marL="1950781" indent="0">
+              <a:buNone/>
+              <a:defRPr sz="1493">
                 <a:solidFill>
                   <a:schemeClr val="tx1">
                     <a:tint val="75000"/>
@@ -1232,9 +1232,9 @@
                 </a:solidFill>
               </a:defRPr>
             </a:lvl5pPr>
-            <a:lvl6pPr marL="2286000" indent="0">
-              <a:buNone/>
-              <a:defRPr sz="1400">
+            <a:lvl6pPr marL="2438476" indent="0">
+              <a:buNone/>
+              <a:defRPr sz="1493">
                 <a:solidFill>
                   <a:schemeClr val="tx1">
                     <a:tint val="75000"/>
@@ -1242,9 +1242,9 @@
                 </a:solidFill>
               </a:defRPr>
             </a:lvl6pPr>
-            <a:lvl7pPr marL="2743200" indent="0">
-              <a:buNone/>
-              <a:defRPr sz="1400">
+            <a:lvl7pPr marL="2926171" indent="0">
+              <a:buNone/>
+              <a:defRPr sz="1493">
                 <a:solidFill>
                   <a:schemeClr val="tx1">
                     <a:tint val="75000"/>
@@ -1252,9 +1252,9 @@
                 </a:solidFill>
               </a:defRPr>
             </a:lvl7pPr>
-            <a:lvl8pPr marL="3200400" indent="0">
-              <a:buNone/>
-              <a:defRPr sz="1400">
+            <a:lvl8pPr marL="3413867" indent="0">
+              <a:buNone/>
+              <a:defRPr sz="1493">
                 <a:solidFill>
                   <a:schemeClr val="tx1">
                     <a:tint val="75000"/>
@@ -1262,9 +1262,9 @@
                 </a:solidFill>
               </a:defRPr>
             </a:lvl8pPr>
-            <a:lvl9pPr marL="3657600" indent="0">
-              <a:buNone/>
-              <a:defRPr sz="1400">
+            <a:lvl9pPr marL="3901562" indent="0">
+              <a:buNone/>
+              <a:defRPr sz="1493">
                 <a:solidFill>
                   <a:schemeClr val="tx1">
                     <a:tint val="75000"/>
@@ -1299,7 +1299,7 @@
           <a:p>
             <a:fld id="{E1A07225-5EC2-4FE8-BBD7-4A2ABB88F5AE}" type="datetimeFigureOut">
               <a:rPr lang="de-DE" smtClean="0"/>
-              <a:t>29.04.2022</a:t>
+              <a:t>05.05.2022</a:t>
             </a:fld>
             <a:endParaRPr lang="de-DE" dirty="0"/>
           </a:p>
@@ -1355,22 +1355,22 @@
         </p:nvSpPr>
         <p:spPr>
           <a:xfrm>
-            <a:off x="531812" y="812222"/>
-            <a:ext cx="609600" cy="584776"/>
+            <a:off x="567543" y="866370"/>
+            <a:ext cx="650558" cy="623761"/>
           </a:xfrm>
           <a:prstGeom prst="rect">
             <a:avLst/>
           </a:prstGeom>
         </p:spPr>
         <p:txBody>
-          <a:bodyPr vert="horz" lIns="91440" tIns="45720" rIns="91440" bIns="45720" rtlCol="0" anchor="ctr">
+          <a:bodyPr vert="horz" lIns="97536" tIns="48768" rIns="97536" bIns="48768" rtlCol="0" anchor="ctr">
             <a:noAutofit/>
           </a:bodyPr>
           <a:lstStyle/>
           <a:p>
             <a:pPr lvl="0"/>
             <a:r>
-              <a:rPr lang="en-US" sz="8000" dirty="0">
+              <a:rPr lang="en-US" sz="8534" dirty="0">
                 <a:solidFill>
                   <a:schemeClr val="tx1"/>
                 </a:solidFill>
@@ -1389,22 +1389,22 @@
         </p:nvSpPr>
         <p:spPr>
           <a:xfrm>
-            <a:off x="10285412" y="2768601"/>
-            <a:ext cx="609600" cy="584776"/>
+            <a:off x="10976463" y="2953174"/>
+            <a:ext cx="650558" cy="623761"/>
           </a:xfrm>
           <a:prstGeom prst="rect">
             <a:avLst/>
           </a:prstGeom>
         </p:spPr>
         <p:txBody>
-          <a:bodyPr vert="horz" lIns="91440" tIns="45720" rIns="91440" bIns="45720" rtlCol="0" anchor="ctr">
+          <a:bodyPr vert="horz" lIns="97536" tIns="48768" rIns="97536" bIns="48768" rtlCol="0" anchor="ctr">
             <a:noAutofit/>
           </a:bodyPr>
           <a:lstStyle/>
           <a:p>
             <a:pPr lvl="0" algn="r"/>
             <a:r>
-              <a:rPr lang="en-US" sz="8000" dirty="0">
+              <a:rPr lang="en-US" sz="8534" dirty="0">
                 <a:solidFill>
                   <a:schemeClr val="tx1"/>
                 </a:solidFill>
@@ -1418,7 +1418,7 @@
     </p:spTree>
     <p:extLst>
       <p:ext uri="{BB962C8B-B14F-4D97-AF65-F5344CB8AC3E}">
-        <p14:creationId xmlns:p14="http://schemas.microsoft.com/office/powerpoint/2010/main" val="3073292323"/>
+        <p14:creationId xmlns:p14="http://schemas.microsoft.com/office/powerpoint/2010/main" val="3680023941"/>
       </p:ext>
     </p:extLst>
   </p:cSld>
@@ -1457,8 +1457,8 @@
         </p:nvSpPr>
         <p:spPr>
           <a:xfrm>
-            <a:off x="684212" y="3429000"/>
-            <a:ext cx="8534400" cy="1697400"/>
+            <a:off x="730182" y="3657600"/>
+            <a:ext cx="9107805" cy="1810560"/>
           </a:xfrm>
         </p:spPr>
         <p:txBody>
@@ -1467,7 +1467,7 @@
           </a:bodyPr>
           <a:lstStyle>
             <a:lvl1pPr algn="l">
-              <a:defRPr sz="3200" b="0" cap="all"/>
+              <a:defRPr sz="3413" b="0" cap="all"/>
             </a:lvl1pPr>
           </a:lstStyle>
           <a:p>
@@ -1491,8 +1491,8 @@
         </p:nvSpPr>
         <p:spPr>
           <a:xfrm>
-            <a:off x="684211" y="5132981"/>
-            <a:ext cx="8535990" cy="860400"/>
+            <a:off x="730181" y="5475180"/>
+            <a:ext cx="9109502" cy="917760"/>
           </a:xfrm>
         </p:spPr>
         <p:txBody>
@@ -1502,7 +1502,7 @@
           <a:lstStyle>
             <a:lvl1pPr marL="0" indent="0" algn="l">
               <a:buNone/>
-              <a:defRPr sz="2000">
+              <a:defRPr sz="2133">
                 <a:solidFill>
                   <a:schemeClr val="bg2">
                     <a:lumMod val="75000"/>
@@ -1510,9 +1510,9 @@
                 </a:solidFill>
               </a:defRPr>
             </a:lvl1pPr>
-            <a:lvl2pPr marL="457200" indent="0">
-              <a:buNone/>
-              <a:defRPr sz="1800">
+            <a:lvl2pPr marL="487695" indent="0">
+              <a:buNone/>
+              <a:defRPr sz="1920">
                 <a:solidFill>
                   <a:schemeClr val="tx1">
                     <a:tint val="75000"/>
@@ -1520,9 +1520,9 @@
                 </a:solidFill>
               </a:defRPr>
             </a:lvl2pPr>
-            <a:lvl3pPr marL="914400" indent="0">
-              <a:buNone/>
-              <a:defRPr sz="1600">
+            <a:lvl3pPr marL="975390" indent="0">
+              <a:buNone/>
+              <a:defRPr sz="1707">
                 <a:solidFill>
                   <a:schemeClr val="tx1">
                     <a:tint val="75000"/>
@@ -1530,9 +1530,9 @@
                 </a:solidFill>
               </a:defRPr>
             </a:lvl3pPr>
-            <a:lvl4pPr marL="1371600" indent="0">
-              <a:buNone/>
-              <a:defRPr sz="1400">
+            <a:lvl4pPr marL="1463086" indent="0">
+              <a:buNone/>
+              <a:defRPr sz="1493">
                 <a:solidFill>
                   <a:schemeClr val="tx1">
                     <a:tint val="75000"/>
@@ -1540,9 +1540,9 @@
                 </a:solidFill>
               </a:defRPr>
             </a:lvl4pPr>
-            <a:lvl5pPr marL="1828800" indent="0">
-              <a:buNone/>
-              <a:defRPr sz="1400">
+            <a:lvl5pPr marL="1950781" indent="0">
+              <a:buNone/>
+              <a:defRPr sz="1493">
                 <a:solidFill>
                   <a:schemeClr val="tx1">
                     <a:tint val="75000"/>
@@ -1550,9 +1550,9 @@
                 </a:solidFill>
               </a:defRPr>
             </a:lvl5pPr>
-            <a:lvl6pPr marL="2286000" indent="0">
-              <a:buNone/>
-              <a:defRPr sz="1400">
+            <a:lvl6pPr marL="2438476" indent="0">
+              <a:buNone/>
+              <a:defRPr sz="1493">
                 <a:solidFill>
                   <a:schemeClr val="tx1">
                     <a:tint val="75000"/>
@@ -1560,9 +1560,9 @@
                 </a:solidFill>
               </a:defRPr>
             </a:lvl6pPr>
-            <a:lvl7pPr marL="2743200" indent="0">
-              <a:buNone/>
-              <a:defRPr sz="1400">
+            <a:lvl7pPr marL="2926171" indent="0">
+              <a:buNone/>
+              <a:defRPr sz="1493">
                 <a:solidFill>
                   <a:schemeClr val="tx1">
                     <a:tint val="75000"/>
@@ -1570,9 +1570,9 @@
                 </a:solidFill>
               </a:defRPr>
             </a:lvl7pPr>
-            <a:lvl8pPr marL="3200400" indent="0">
-              <a:buNone/>
-              <a:defRPr sz="1400">
+            <a:lvl8pPr marL="3413867" indent="0">
+              <a:buNone/>
+              <a:defRPr sz="1493">
                 <a:solidFill>
                   <a:schemeClr val="tx1">
                     <a:tint val="75000"/>
@@ -1580,9 +1580,9 @@
                 </a:solidFill>
               </a:defRPr>
             </a:lvl8pPr>
-            <a:lvl9pPr marL="3657600" indent="0">
-              <a:buNone/>
-              <a:defRPr sz="1400">
+            <a:lvl9pPr marL="3901562" indent="0">
+              <a:buNone/>
+              <a:defRPr sz="1493">
                 <a:solidFill>
                   <a:schemeClr val="tx1">
                     <a:tint val="75000"/>
@@ -1617,7 +1617,7 @@
           <a:p>
             <a:fld id="{E1A07225-5EC2-4FE8-BBD7-4A2ABB88F5AE}" type="datetimeFigureOut">
               <a:rPr lang="de-DE" smtClean="0"/>
-              <a:t>29.04.2022</a:t>
+              <a:t>05.05.2022</a:t>
             </a:fld>
             <a:endParaRPr lang="de-DE" dirty="0"/>
           </a:p>
@@ -1668,7 +1668,7 @@
     </p:spTree>
     <p:extLst>
       <p:ext uri="{BB962C8B-B14F-4D97-AF65-F5344CB8AC3E}">
-        <p14:creationId xmlns:p14="http://schemas.microsoft.com/office/powerpoint/2010/main" val="522256076"/>
+        <p14:creationId xmlns:p14="http://schemas.microsoft.com/office/powerpoint/2010/main" val="2872670475"/>
       </p:ext>
     </p:extLst>
   </p:cSld>
@@ -1707,8 +1707,8 @@
         </p:nvSpPr>
         <p:spPr>
           <a:xfrm>
-            <a:off x="1141413" y="685800"/>
-            <a:ext cx="9144000" cy="2743200"/>
+            <a:off x="1218101" y="731520"/>
+            <a:ext cx="9758363" cy="2926080"/>
           </a:xfrm>
         </p:spPr>
         <p:txBody>
@@ -1717,7 +1717,7 @@
           </a:bodyPr>
           <a:lstStyle>
             <a:lvl1pPr algn="l">
-              <a:defRPr sz="3200" b="0" cap="all">
+              <a:defRPr sz="3413" b="0" cap="all">
                 <a:solidFill>
                   <a:schemeClr val="tx1"/>
                 </a:solidFill>
@@ -1745,8 +1745,8 @@
         </p:nvSpPr>
         <p:spPr>
           <a:xfrm>
-            <a:off x="684212" y="3928534"/>
-            <a:ext cx="8534401" cy="1049866"/>
+            <a:off x="730183" y="4190436"/>
+            <a:ext cx="9107806" cy="1119857"/>
           </a:xfrm>
         </p:spPr>
         <p:txBody>
@@ -1756,7 +1756,7 @@
           <a:lstStyle>
             <a:lvl1pPr>
               <a:buNone/>
-              <a:defRPr lang="en-US" sz="2400" b="0" cap="all" dirty="0">
+              <a:defRPr lang="en-US" sz="2560" b="0" cap="all" dirty="0">
                 <a:ln w="3175" cmpd="sng">
                   <a:noFill/>
                 </a:ln>
@@ -1793,8 +1793,8 @@
         </p:nvSpPr>
         <p:spPr>
           <a:xfrm>
-            <a:off x="684211" y="4978400"/>
-            <a:ext cx="8534401" cy="1016000"/>
+            <a:off x="730182" y="5310294"/>
+            <a:ext cx="9107806" cy="1083733"/>
           </a:xfrm>
         </p:spPr>
         <p:txBody>
@@ -1804,7 +1804,7 @@
           <a:lstStyle>
             <a:lvl1pPr marL="0" indent="0" algn="l">
               <a:buNone/>
-              <a:defRPr sz="1800">
+              <a:defRPr sz="1920">
                 <a:solidFill>
                   <a:schemeClr val="bg2">
                     <a:lumMod val="75000"/>
@@ -1812,9 +1812,9 @@
                 </a:solidFill>
               </a:defRPr>
             </a:lvl1pPr>
-            <a:lvl2pPr marL="457200" indent="0">
-              <a:buNone/>
-              <a:defRPr sz="1800">
+            <a:lvl2pPr marL="487695" indent="0">
+              <a:buNone/>
+              <a:defRPr sz="1920">
                 <a:solidFill>
                   <a:schemeClr val="tx1">
                     <a:tint val="75000"/>
@@ -1822,9 +1822,9 @@
                 </a:solidFill>
               </a:defRPr>
             </a:lvl2pPr>
-            <a:lvl3pPr marL="914400" indent="0">
-              <a:buNone/>
-              <a:defRPr sz="1600">
+            <a:lvl3pPr marL="975390" indent="0">
+              <a:buNone/>
+              <a:defRPr sz="1707">
                 <a:solidFill>
                   <a:schemeClr val="tx1">
                     <a:tint val="75000"/>
@@ -1832,9 +1832,9 @@
                 </a:solidFill>
               </a:defRPr>
             </a:lvl3pPr>
-            <a:lvl4pPr marL="1371600" indent="0">
-              <a:buNone/>
-              <a:defRPr sz="1400">
+            <a:lvl4pPr marL="1463086" indent="0">
+              <a:buNone/>
+              <a:defRPr sz="1493">
                 <a:solidFill>
                   <a:schemeClr val="tx1">
                     <a:tint val="75000"/>
@@ -1842,9 +1842,9 @@
                 </a:solidFill>
               </a:defRPr>
             </a:lvl4pPr>
-            <a:lvl5pPr marL="1828800" indent="0">
-              <a:buNone/>
-              <a:defRPr sz="1400">
+            <a:lvl5pPr marL="1950781" indent="0">
+              <a:buNone/>
+              <a:defRPr sz="1493">
                 <a:solidFill>
                   <a:schemeClr val="tx1">
                     <a:tint val="75000"/>
@@ -1852,9 +1852,9 @@
                 </a:solidFill>
               </a:defRPr>
             </a:lvl5pPr>
-            <a:lvl6pPr marL="2286000" indent="0">
-              <a:buNone/>
-              <a:defRPr sz="1400">
+            <a:lvl6pPr marL="2438476" indent="0">
+              <a:buNone/>
+              <a:defRPr sz="1493">
                 <a:solidFill>
                   <a:schemeClr val="tx1">
                     <a:tint val="75000"/>
@@ -1862,9 +1862,9 @@
                 </a:solidFill>
               </a:defRPr>
             </a:lvl6pPr>
-            <a:lvl7pPr marL="2743200" indent="0">
-              <a:buNone/>
-              <a:defRPr sz="1400">
+            <a:lvl7pPr marL="2926171" indent="0">
+              <a:buNone/>
+              <a:defRPr sz="1493">
                 <a:solidFill>
                   <a:schemeClr val="tx1">
                     <a:tint val="75000"/>
@@ -1872,9 +1872,9 @@
                 </a:solidFill>
               </a:defRPr>
             </a:lvl7pPr>
-            <a:lvl8pPr marL="3200400" indent="0">
-              <a:buNone/>
-              <a:defRPr sz="1400">
+            <a:lvl8pPr marL="3413867" indent="0">
+              <a:buNone/>
+              <a:defRPr sz="1493">
                 <a:solidFill>
                   <a:schemeClr val="tx1">
                     <a:tint val="75000"/>
@@ -1882,9 +1882,9 @@
                 </a:solidFill>
               </a:defRPr>
             </a:lvl8pPr>
-            <a:lvl9pPr marL="3657600" indent="0">
-              <a:buNone/>
-              <a:defRPr sz="1400">
+            <a:lvl9pPr marL="3901562" indent="0">
+              <a:buNone/>
+              <a:defRPr sz="1493">
                 <a:solidFill>
                   <a:schemeClr val="tx1">
                     <a:tint val="75000"/>
@@ -1919,7 +1919,7 @@
           <a:p>
             <a:fld id="{E1A07225-5EC2-4FE8-BBD7-4A2ABB88F5AE}" type="datetimeFigureOut">
               <a:rPr lang="de-DE" smtClean="0"/>
-              <a:t>29.04.2022</a:t>
+              <a:t>05.05.2022</a:t>
             </a:fld>
             <a:endParaRPr lang="de-DE" dirty="0"/>
           </a:p>
@@ -1975,22 +1975,22 @@
         </p:nvSpPr>
         <p:spPr>
           <a:xfrm>
-            <a:off x="531812" y="812222"/>
-            <a:ext cx="609600" cy="584776"/>
+            <a:off x="567543" y="866370"/>
+            <a:ext cx="650558" cy="623761"/>
           </a:xfrm>
           <a:prstGeom prst="rect">
             <a:avLst/>
           </a:prstGeom>
         </p:spPr>
         <p:txBody>
-          <a:bodyPr vert="horz" lIns="91440" tIns="45720" rIns="91440" bIns="45720" rtlCol="0" anchor="ctr">
+          <a:bodyPr vert="horz" lIns="97536" tIns="48768" rIns="97536" bIns="48768" rtlCol="0" anchor="ctr">
             <a:noAutofit/>
           </a:bodyPr>
           <a:lstStyle/>
           <a:p>
             <a:pPr lvl="0"/>
             <a:r>
-              <a:rPr lang="en-US" sz="8000" dirty="0">
+              <a:rPr lang="en-US" sz="8534" dirty="0">
                 <a:solidFill>
                   <a:schemeClr val="tx1"/>
                 </a:solidFill>
@@ -2009,22 +2009,22 @@
         </p:nvSpPr>
         <p:spPr>
           <a:xfrm>
-            <a:off x="10285412" y="2768601"/>
-            <a:ext cx="609600" cy="584776"/>
+            <a:off x="10976463" y="2953174"/>
+            <a:ext cx="650558" cy="623761"/>
           </a:xfrm>
           <a:prstGeom prst="rect">
             <a:avLst/>
           </a:prstGeom>
         </p:spPr>
         <p:txBody>
-          <a:bodyPr vert="horz" lIns="91440" tIns="45720" rIns="91440" bIns="45720" rtlCol="0" anchor="ctr">
+          <a:bodyPr vert="horz" lIns="97536" tIns="48768" rIns="97536" bIns="48768" rtlCol="0" anchor="ctr">
             <a:noAutofit/>
           </a:bodyPr>
           <a:lstStyle/>
           <a:p>
             <a:pPr lvl="0" algn="r"/>
             <a:r>
-              <a:rPr lang="en-US" sz="8000" dirty="0">
+              <a:rPr lang="en-US" sz="8534" dirty="0">
                 <a:solidFill>
                   <a:schemeClr val="tx1"/>
                 </a:solidFill>
@@ -2038,7 +2038,7 @@
     </p:spTree>
     <p:extLst>
       <p:ext uri="{BB962C8B-B14F-4D97-AF65-F5344CB8AC3E}">
-        <p14:creationId xmlns:p14="http://schemas.microsoft.com/office/powerpoint/2010/main" val="430508168"/>
+        <p14:creationId xmlns:p14="http://schemas.microsoft.com/office/powerpoint/2010/main" val="3456371417"/>
       </p:ext>
     </p:extLst>
   </p:cSld>
@@ -2077,8 +2077,8 @@
         </p:nvSpPr>
         <p:spPr>
           <a:xfrm>
-            <a:off x="684213" y="685800"/>
-            <a:ext cx="10058400" cy="2743200"/>
+            <a:off x="730183" y="731520"/>
+            <a:ext cx="10734199" cy="2926080"/>
           </a:xfrm>
         </p:spPr>
         <p:txBody>
@@ -2112,8 +2112,8 @@
         </p:nvSpPr>
         <p:spPr>
           <a:xfrm>
-            <a:off x="684212" y="3928534"/>
-            <a:ext cx="8534400" cy="838200"/>
+            <a:off x="730182" y="4190436"/>
+            <a:ext cx="9107805" cy="894080"/>
           </a:xfrm>
         </p:spPr>
         <p:txBody>
@@ -2123,7 +2123,7 @@
           <a:lstStyle>
             <a:lvl1pPr>
               <a:buNone/>
-              <a:defRPr lang="en-US" sz="2400" b="0" cap="all" dirty="0">
+              <a:defRPr lang="en-US" sz="2560" b="0" cap="all" dirty="0">
                 <a:ln w="3175" cmpd="sng">
                   <a:noFill/>
                 </a:ln>
@@ -2160,8 +2160,8 @@
         </p:nvSpPr>
         <p:spPr>
           <a:xfrm>
-            <a:off x="684211" y="4766732"/>
-            <a:ext cx="8534401" cy="1227667"/>
+            <a:off x="730182" y="5084515"/>
+            <a:ext cx="9107806" cy="1309511"/>
           </a:xfrm>
         </p:spPr>
         <p:txBody>
@@ -2171,7 +2171,7 @@
           <a:lstStyle>
             <a:lvl1pPr marL="0" indent="0" algn="l">
               <a:buNone/>
-              <a:defRPr sz="1800">
+              <a:defRPr sz="1920">
                 <a:solidFill>
                   <a:schemeClr val="bg2">
                     <a:lumMod val="75000"/>
@@ -2179,9 +2179,9 @@
                 </a:solidFill>
               </a:defRPr>
             </a:lvl1pPr>
-            <a:lvl2pPr marL="457200" indent="0">
-              <a:buNone/>
-              <a:defRPr sz="1800">
+            <a:lvl2pPr marL="487695" indent="0">
+              <a:buNone/>
+              <a:defRPr sz="1920">
                 <a:solidFill>
                   <a:schemeClr val="tx1">
                     <a:tint val="75000"/>
@@ -2189,9 +2189,9 @@
                 </a:solidFill>
               </a:defRPr>
             </a:lvl2pPr>
-            <a:lvl3pPr marL="914400" indent="0">
-              <a:buNone/>
-              <a:defRPr sz="1600">
+            <a:lvl3pPr marL="975390" indent="0">
+              <a:buNone/>
+              <a:defRPr sz="1707">
                 <a:solidFill>
                   <a:schemeClr val="tx1">
                     <a:tint val="75000"/>
@@ -2199,9 +2199,9 @@
                 </a:solidFill>
               </a:defRPr>
             </a:lvl3pPr>
-            <a:lvl4pPr marL="1371600" indent="0">
-              <a:buNone/>
-              <a:defRPr sz="1400">
+            <a:lvl4pPr marL="1463086" indent="0">
+              <a:buNone/>
+              <a:defRPr sz="1493">
                 <a:solidFill>
                   <a:schemeClr val="tx1">
                     <a:tint val="75000"/>
@@ -2209,9 +2209,9 @@
                 </a:solidFill>
               </a:defRPr>
             </a:lvl4pPr>
-            <a:lvl5pPr marL="1828800" indent="0">
-              <a:buNone/>
-              <a:defRPr sz="1400">
+            <a:lvl5pPr marL="1950781" indent="0">
+              <a:buNone/>
+              <a:defRPr sz="1493">
                 <a:solidFill>
                   <a:schemeClr val="tx1">
                     <a:tint val="75000"/>
@@ -2219,9 +2219,9 @@
                 </a:solidFill>
               </a:defRPr>
             </a:lvl5pPr>
-            <a:lvl6pPr marL="2286000" indent="0">
-              <a:buNone/>
-              <a:defRPr sz="1400">
+            <a:lvl6pPr marL="2438476" indent="0">
+              <a:buNone/>
+              <a:defRPr sz="1493">
                 <a:solidFill>
                   <a:schemeClr val="tx1">
                     <a:tint val="75000"/>
@@ -2229,9 +2229,9 @@
                 </a:solidFill>
               </a:defRPr>
             </a:lvl6pPr>
-            <a:lvl7pPr marL="2743200" indent="0">
-              <a:buNone/>
-              <a:defRPr sz="1400">
+            <a:lvl7pPr marL="2926171" indent="0">
+              <a:buNone/>
+              <a:defRPr sz="1493">
                 <a:solidFill>
                   <a:schemeClr val="tx1">
                     <a:tint val="75000"/>
@@ -2239,9 +2239,9 @@
                 </a:solidFill>
               </a:defRPr>
             </a:lvl7pPr>
-            <a:lvl8pPr marL="3200400" indent="0">
-              <a:buNone/>
-              <a:defRPr sz="1400">
+            <a:lvl8pPr marL="3413867" indent="0">
+              <a:buNone/>
+              <a:defRPr sz="1493">
                 <a:solidFill>
                   <a:schemeClr val="tx1">
                     <a:tint val="75000"/>
@@ -2249,9 +2249,9 @@
                 </a:solidFill>
               </a:defRPr>
             </a:lvl8pPr>
-            <a:lvl9pPr marL="3657600" indent="0">
-              <a:buNone/>
-              <a:defRPr sz="1400">
+            <a:lvl9pPr marL="3901562" indent="0">
+              <a:buNone/>
+              <a:defRPr sz="1493">
                 <a:solidFill>
                   <a:schemeClr val="tx1">
                     <a:tint val="75000"/>
@@ -2286,7 +2286,7 @@
           <a:p>
             <a:fld id="{E1A07225-5EC2-4FE8-BBD7-4A2ABB88F5AE}" type="datetimeFigureOut">
               <a:rPr lang="de-DE" smtClean="0"/>
-              <a:t>29.04.2022</a:t>
+              <a:t>05.05.2022</a:t>
             </a:fld>
             <a:endParaRPr lang="de-DE" dirty="0"/>
           </a:p>
@@ -2337,7 +2337,7 @@
     </p:spTree>
     <p:extLst>
       <p:ext uri="{BB962C8B-B14F-4D97-AF65-F5344CB8AC3E}">
-        <p14:creationId xmlns:p14="http://schemas.microsoft.com/office/powerpoint/2010/main" val="3022004257"/>
+        <p14:creationId xmlns:p14="http://schemas.microsoft.com/office/powerpoint/2010/main" val="171930258"/>
       </p:ext>
     </p:extLst>
   </p:cSld>
@@ -2460,7 +2460,7 @@
           <a:p>
             <a:fld id="{E1A07225-5EC2-4FE8-BBD7-4A2ABB88F5AE}" type="datetimeFigureOut">
               <a:rPr lang="de-DE" smtClean="0"/>
-              <a:t>29.04.2022</a:t>
+              <a:t>05.05.2022</a:t>
             </a:fld>
             <a:endParaRPr lang="de-DE" dirty="0"/>
           </a:p>
@@ -2511,7 +2511,7 @@
     </p:spTree>
     <p:extLst>
       <p:ext uri="{BB962C8B-B14F-4D97-AF65-F5344CB8AC3E}">
-        <p14:creationId xmlns:p14="http://schemas.microsoft.com/office/powerpoint/2010/main" val="3009976143"/>
+        <p14:creationId xmlns:p14="http://schemas.microsoft.com/office/powerpoint/2010/main" val="4112732737"/>
       </p:ext>
     </p:extLst>
   </p:cSld>
@@ -2550,8 +2550,8 @@
         </p:nvSpPr>
         <p:spPr>
           <a:xfrm>
-            <a:off x="8685212" y="685800"/>
-            <a:ext cx="2057400" cy="4572000"/>
+            <a:off x="9268749" y="731520"/>
+            <a:ext cx="2195632" cy="4876800"/>
           </a:xfrm>
         </p:spPr>
         <p:txBody>
@@ -2578,8 +2578,8 @@
         </p:nvSpPr>
         <p:spPr>
           <a:xfrm>
-            <a:off x="685800" y="685800"/>
-            <a:ext cx="7823200" cy="5308600"/>
+            <a:off x="731877" y="731520"/>
+            <a:ext cx="8348821" cy="5662507"/>
           </a:xfrm>
         </p:spPr>
         <p:txBody>
@@ -2640,7 +2640,7 @@
           <a:p>
             <a:fld id="{E1A07225-5EC2-4FE8-BBD7-4A2ABB88F5AE}" type="datetimeFigureOut">
               <a:rPr lang="de-DE" smtClean="0"/>
-              <a:t>29.04.2022</a:t>
+              <a:t>05.05.2022</a:t>
             </a:fld>
             <a:endParaRPr lang="de-DE" dirty="0"/>
           </a:p>
@@ -2691,7 +2691,7 @@
     </p:spTree>
     <p:extLst>
       <p:ext uri="{BB962C8B-B14F-4D97-AF65-F5344CB8AC3E}">
-        <p14:creationId xmlns:p14="http://schemas.microsoft.com/office/powerpoint/2010/main" val="1234852520"/>
+        <p14:creationId xmlns:p14="http://schemas.microsoft.com/office/powerpoint/2010/main" val="4121492932"/>
       </p:ext>
     </p:extLst>
   </p:cSld>
@@ -2810,7 +2810,7 @@
           <a:p>
             <a:fld id="{E1A07225-5EC2-4FE8-BBD7-4A2ABB88F5AE}" type="datetimeFigureOut">
               <a:rPr lang="de-DE" smtClean="0"/>
-              <a:t>29.04.2022</a:t>
+              <a:t>05.05.2022</a:t>
             </a:fld>
             <a:endParaRPr lang="de-DE" dirty="0"/>
           </a:p>
@@ -2861,7 +2861,7 @@
     </p:spTree>
     <p:extLst>
       <p:ext uri="{BB962C8B-B14F-4D97-AF65-F5344CB8AC3E}">
-        <p14:creationId xmlns:p14="http://schemas.microsoft.com/office/powerpoint/2010/main" val="2323033914"/>
+        <p14:creationId xmlns:p14="http://schemas.microsoft.com/office/powerpoint/2010/main" val="782083559"/>
       </p:ext>
     </p:extLst>
   </p:cSld>
@@ -2900,8 +2900,8 @@
         </p:nvSpPr>
         <p:spPr>
           <a:xfrm>
-            <a:off x="684211" y="2006600"/>
-            <a:ext cx="8534401" cy="2281600"/>
+            <a:off x="730182" y="2140373"/>
+            <a:ext cx="9107806" cy="2433707"/>
           </a:xfrm>
         </p:spPr>
         <p:txBody>
@@ -2910,7 +2910,7 @@
           </a:bodyPr>
           <a:lstStyle>
             <a:lvl1pPr algn="l">
-              <a:defRPr sz="3600" b="0" cap="all"/>
+              <a:defRPr sz="3840" b="0" cap="all"/>
             </a:lvl1pPr>
           </a:lstStyle>
           <a:p>
@@ -2934,8 +2934,8 @@
         </p:nvSpPr>
         <p:spPr>
           <a:xfrm>
-            <a:off x="684213" y="4495800"/>
-            <a:ext cx="8534400" cy="1498600"/>
+            <a:off x="730184" y="4795520"/>
+            <a:ext cx="9107805" cy="1598507"/>
           </a:xfrm>
         </p:spPr>
         <p:txBody>
@@ -2945,7 +2945,7 @@
           <a:lstStyle>
             <a:lvl1pPr marL="0" indent="0" algn="l">
               <a:buNone/>
-              <a:defRPr sz="1800">
+              <a:defRPr sz="1920">
                 <a:solidFill>
                   <a:schemeClr val="bg2">
                     <a:lumMod val="75000"/>
@@ -2953,9 +2953,9 @@
                 </a:solidFill>
               </a:defRPr>
             </a:lvl1pPr>
-            <a:lvl2pPr marL="457200" indent="0">
-              <a:buNone/>
-              <a:defRPr sz="1800">
+            <a:lvl2pPr marL="487695" indent="0">
+              <a:buNone/>
+              <a:defRPr sz="1920">
                 <a:solidFill>
                   <a:schemeClr val="tx1">
                     <a:tint val="75000"/>
@@ -2963,9 +2963,9 @@
                 </a:solidFill>
               </a:defRPr>
             </a:lvl2pPr>
-            <a:lvl3pPr marL="914400" indent="0">
-              <a:buNone/>
-              <a:defRPr sz="1600">
+            <a:lvl3pPr marL="975390" indent="0">
+              <a:buNone/>
+              <a:defRPr sz="1707">
                 <a:solidFill>
                   <a:schemeClr val="tx1">
                     <a:tint val="75000"/>
@@ -2973,9 +2973,9 @@
                 </a:solidFill>
               </a:defRPr>
             </a:lvl3pPr>
-            <a:lvl4pPr marL="1371600" indent="0">
-              <a:buNone/>
-              <a:defRPr sz="1400">
+            <a:lvl4pPr marL="1463086" indent="0">
+              <a:buNone/>
+              <a:defRPr sz="1493">
                 <a:solidFill>
                   <a:schemeClr val="tx1">
                     <a:tint val="75000"/>
@@ -2983,9 +2983,9 @@
                 </a:solidFill>
               </a:defRPr>
             </a:lvl4pPr>
-            <a:lvl5pPr marL="1828800" indent="0">
-              <a:buNone/>
-              <a:defRPr sz="1400">
+            <a:lvl5pPr marL="1950781" indent="0">
+              <a:buNone/>
+              <a:defRPr sz="1493">
                 <a:solidFill>
                   <a:schemeClr val="tx1">
                     <a:tint val="75000"/>
@@ -2993,9 +2993,9 @@
                 </a:solidFill>
               </a:defRPr>
             </a:lvl5pPr>
-            <a:lvl6pPr marL="2286000" indent="0">
-              <a:buNone/>
-              <a:defRPr sz="1400">
+            <a:lvl6pPr marL="2438476" indent="0">
+              <a:buNone/>
+              <a:defRPr sz="1493">
                 <a:solidFill>
                   <a:schemeClr val="tx1">
                     <a:tint val="75000"/>
@@ -3003,9 +3003,9 @@
                 </a:solidFill>
               </a:defRPr>
             </a:lvl6pPr>
-            <a:lvl7pPr marL="2743200" indent="0">
-              <a:buNone/>
-              <a:defRPr sz="1400">
+            <a:lvl7pPr marL="2926171" indent="0">
+              <a:buNone/>
+              <a:defRPr sz="1493">
                 <a:solidFill>
                   <a:schemeClr val="tx1">
                     <a:tint val="75000"/>
@@ -3013,9 +3013,9 @@
                 </a:solidFill>
               </a:defRPr>
             </a:lvl7pPr>
-            <a:lvl8pPr marL="3200400" indent="0">
-              <a:buNone/>
-              <a:defRPr sz="1400">
+            <a:lvl8pPr marL="3413867" indent="0">
+              <a:buNone/>
+              <a:defRPr sz="1493">
                 <a:solidFill>
                   <a:schemeClr val="tx1">
                     <a:tint val="75000"/>
@@ -3023,9 +3023,9 @@
                 </a:solidFill>
               </a:defRPr>
             </a:lvl8pPr>
-            <a:lvl9pPr marL="3657600" indent="0">
-              <a:buNone/>
-              <a:defRPr sz="1400">
+            <a:lvl9pPr marL="3901562" indent="0">
+              <a:buNone/>
+              <a:defRPr sz="1493">
                 <a:solidFill>
                   <a:schemeClr val="tx1">
                     <a:tint val="75000"/>
@@ -3060,7 +3060,7 @@
           <a:p>
             <a:fld id="{E1A07225-5EC2-4FE8-BBD7-4A2ABB88F5AE}" type="datetimeFigureOut">
               <a:rPr lang="de-DE" smtClean="0"/>
-              <a:t>29.04.2022</a:t>
+              <a:t>05.05.2022</a:t>
             </a:fld>
             <a:endParaRPr lang="de-DE" dirty="0"/>
           </a:p>
@@ -3111,7 +3111,7 @@
     </p:spTree>
     <p:extLst>
       <p:ext uri="{BB962C8B-B14F-4D97-AF65-F5344CB8AC3E}">
-        <p14:creationId xmlns:p14="http://schemas.microsoft.com/office/powerpoint/2010/main" val="2759481602"/>
+        <p14:creationId xmlns:p14="http://schemas.microsoft.com/office/powerpoint/2010/main" val="2506207755"/>
       </p:ext>
     </p:extLst>
   </p:cSld>
@@ -3173,8 +3173,8 @@
         </p:nvSpPr>
         <p:spPr>
           <a:xfrm>
-            <a:off x="684211" y="685800"/>
-            <a:ext cx="4937655" cy="3615267"/>
+            <a:off x="730182" y="731520"/>
+            <a:ext cx="5269404" cy="3856285"/>
           </a:xfrm>
         </p:spPr>
         <p:txBody>
@@ -3232,8 +3232,8 @@
         </p:nvSpPr>
         <p:spPr>
           <a:xfrm>
-            <a:off x="5808133" y="685801"/>
-            <a:ext cx="4934479" cy="3615266"/>
+            <a:off x="6198368" y="731521"/>
+            <a:ext cx="5266014" cy="3856284"/>
           </a:xfrm>
         </p:spPr>
         <p:txBody>
@@ -3296,7 +3296,7 @@
           <a:p>
             <a:fld id="{E1A07225-5EC2-4FE8-BBD7-4A2ABB88F5AE}" type="datetimeFigureOut">
               <a:rPr lang="de-DE" smtClean="0"/>
-              <a:t>29.04.2022</a:t>
+              <a:t>05.05.2022</a:t>
             </a:fld>
             <a:endParaRPr lang="de-DE" dirty="0"/>
           </a:p>
@@ -3347,7 +3347,7 @@
     </p:spTree>
     <p:extLst>
       <p:ext uri="{BB962C8B-B14F-4D97-AF65-F5344CB8AC3E}">
-        <p14:creationId xmlns:p14="http://schemas.microsoft.com/office/powerpoint/2010/main" val="1227166878"/>
+        <p14:creationId xmlns:p14="http://schemas.microsoft.com/office/powerpoint/2010/main" val="1096242803"/>
       </p:ext>
     </p:extLst>
   </p:cSld>
@@ -3413,8 +3413,8 @@
         </p:nvSpPr>
         <p:spPr>
           <a:xfrm>
-            <a:off x="972080" y="685800"/>
-            <a:ext cx="4649787" cy="576262"/>
+            <a:off x="1037392" y="731520"/>
+            <a:ext cx="4962195" cy="614679"/>
           </a:xfrm>
         </p:spPr>
         <p:txBody>
@@ -3424,43 +3424,43 @@
           <a:lstStyle>
             <a:lvl1pPr marL="0" indent="0">
               <a:buNone/>
-              <a:defRPr sz="2800" b="0">
+              <a:defRPr sz="2987" b="0">
                 <a:solidFill>
                   <a:schemeClr val="tx1"/>
                 </a:solidFill>
               </a:defRPr>
             </a:lvl1pPr>
-            <a:lvl2pPr marL="457200" indent="0">
-              <a:buNone/>
-              <a:defRPr sz="2000" b="1"/>
+            <a:lvl2pPr marL="487695" indent="0">
+              <a:buNone/>
+              <a:defRPr sz="2133" b="1"/>
             </a:lvl2pPr>
-            <a:lvl3pPr marL="914400" indent="0">
-              <a:buNone/>
-              <a:defRPr sz="1800" b="1"/>
+            <a:lvl3pPr marL="975390" indent="0">
+              <a:buNone/>
+              <a:defRPr sz="1920" b="1"/>
             </a:lvl3pPr>
-            <a:lvl4pPr marL="1371600" indent="0">
-              <a:buNone/>
-              <a:defRPr sz="1600" b="1"/>
+            <a:lvl4pPr marL="1463086" indent="0">
+              <a:buNone/>
+              <a:defRPr sz="1707" b="1"/>
             </a:lvl4pPr>
-            <a:lvl5pPr marL="1828800" indent="0">
-              <a:buNone/>
-              <a:defRPr sz="1600" b="1"/>
+            <a:lvl5pPr marL="1950781" indent="0">
+              <a:buNone/>
+              <a:defRPr sz="1707" b="1"/>
             </a:lvl5pPr>
-            <a:lvl6pPr marL="2286000" indent="0">
-              <a:buNone/>
-              <a:defRPr sz="1600" b="1"/>
+            <a:lvl6pPr marL="2438476" indent="0">
+              <a:buNone/>
+              <a:defRPr sz="1707" b="1"/>
             </a:lvl6pPr>
-            <a:lvl7pPr marL="2743200" indent="0">
-              <a:buNone/>
-              <a:defRPr sz="1600" b="1"/>
+            <a:lvl7pPr marL="2926171" indent="0">
+              <a:buNone/>
+              <a:defRPr sz="1707" b="1"/>
             </a:lvl7pPr>
-            <a:lvl8pPr marL="3200400" indent="0">
-              <a:buNone/>
-              <a:defRPr sz="1600" b="1"/>
+            <a:lvl8pPr marL="3413867" indent="0">
+              <a:buNone/>
+              <a:defRPr sz="1707" b="1"/>
             </a:lvl8pPr>
-            <a:lvl9pPr marL="3657600" indent="0">
-              <a:buNone/>
-              <a:defRPr sz="1600" b="1"/>
+            <a:lvl9pPr marL="3901562" indent="0">
+              <a:buNone/>
+              <a:defRPr sz="1707" b="1"/>
             </a:lvl9pPr>
           </a:lstStyle>
           <a:p>
@@ -3484,8 +3484,8 @@
         </p:nvSpPr>
         <p:spPr>
           <a:xfrm>
-            <a:off x="684211" y="1270529"/>
-            <a:ext cx="4937655" cy="3030538"/>
+            <a:off x="730182" y="1355231"/>
+            <a:ext cx="5269404" cy="3232574"/>
           </a:xfrm>
         </p:spPr>
         <p:txBody>
@@ -3543,8 +3543,8 @@
         </p:nvSpPr>
         <p:spPr>
           <a:xfrm>
-            <a:off x="6079066" y="685800"/>
-            <a:ext cx="4665134" cy="576262"/>
+            <a:off x="6487503" y="731520"/>
+            <a:ext cx="4978573" cy="614679"/>
           </a:xfrm>
         </p:spPr>
         <p:txBody>
@@ -3554,43 +3554,43 @@
           <a:lstStyle>
             <a:lvl1pPr marL="0" indent="0">
               <a:buNone/>
-              <a:defRPr sz="2800" b="0">
+              <a:defRPr sz="2987" b="0">
                 <a:solidFill>
                   <a:schemeClr val="tx1"/>
                 </a:solidFill>
               </a:defRPr>
             </a:lvl1pPr>
-            <a:lvl2pPr marL="457200" indent="0">
-              <a:buNone/>
-              <a:defRPr sz="2000" b="1"/>
+            <a:lvl2pPr marL="487695" indent="0">
+              <a:buNone/>
+              <a:defRPr sz="2133" b="1"/>
             </a:lvl2pPr>
-            <a:lvl3pPr marL="914400" indent="0">
-              <a:buNone/>
-              <a:defRPr sz="1800" b="1"/>
+            <a:lvl3pPr marL="975390" indent="0">
+              <a:buNone/>
+              <a:defRPr sz="1920" b="1"/>
             </a:lvl3pPr>
-            <a:lvl4pPr marL="1371600" indent="0">
-              <a:buNone/>
-              <a:defRPr sz="1600" b="1"/>
+            <a:lvl4pPr marL="1463086" indent="0">
+              <a:buNone/>
+              <a:defRPr sz="1707" b="1"/>
             </a:lvl4pPr>
-            <a:lvl5pPr marL="1828800" indent="0">
-              <a:buNone/>
-              <a:defRPr sz="1600" b="1"/>
+            <a:lvl5pPr marL="1950781" indent="0">
+              <a:buNone/>
+              <a:defRPr sz="1707" b="1"/>
             </a:lvl5pPr>
-            <a:lvl6pPr marL="2286000" indent="0">
-              <a:buNone/>
-              <a:defRPr sz="1600" b="1"/>
+            <a:lvl6pPr marL="2438476" indent="0">
+              <a:buNone/>
+              <a:defRPr sz="1707" b="1"/>
             </a:lvl6pPr>
-            <a:lvl7pPr marL="2743200" indent="0">
-              <a:buNone/>
-              <a:defRPr sz="1600" b="1"/>
+            <a:lvl7pPr marL="2926171" indent="0">
+              <a:buNone/>
+              <a:defRPr sz="1707" b="1"/>
             </a:lvl7pPr>
-            <a:lvl8pPr marL="3200400" indent="0">
-              <a:buNone/>
-              <a:defRPr sz="1600" b="1"/>
+            <a:lvl8pPr marL="3413867" indent="0">
+              <a:buNone/>
+              <a:defRPr sz="1707" b="1"/>
             </a:lvl8pPr>
-            <a:lvl9pPr marL="3657600" indent="0">
-              <a:buNone/>
-              <a:defRPr sz="1600" b="1"/>
+            <a:lvl9pPr marL="3901562" indent="0">
+              <a:buNone/>
+              <a:defRPr sz="1707" b="1"/>
             </a:lvl9pPr>
           </a:lstStyle>
           <a:p>
@@ -3614,8 +3614,8 @@
         </p:nvSpPr>
         <p:spPr>
           <a:xfrm>
-            <a:off x="5806545" y="1262062"/>
-            <a:ext cx="4929188" cy="3030538"/>
+            <a:off x="6196672" y="1346199"/>
+            <a:ext cx="5260368" cy="3232574"/>
           </a:xfrm>
         </p:spPr>
         <p:txBody>
@@ -3678,7 +3678,7 @@
           <a:p>
             <a:fld id="{E1A07225-5EC2-4FE8-BBD7-4A2ABB88F5AE}" type="datetimeFigureOut">
               <a:rPr lang="de-DE" smtClean="0"/>
-              <a:t>29.04.2022</a:t>
+              <a:t>05.05.2022</a:t>
             </a:fld>
             <a:endParaRPr lang="de-DE" dirty="0"/>
           </a:p>
@@ -3729,7 +3729,7 @@
     </p:spTree>
     <p:extLst>
       <p:ext uri="{BB962C8B-B14F-4D97-AF65-F5344CB8AC3E}">
-        <p14:creationId xmlns:p14="http://schemas.microsoft.com/office/powerpoint/2010/main" val="1351752436"/>
+        <p14:creationId xmlns:p14="http://schemas.microsoft.com/office/powerpoint/2010/main" val="2607057454"/>
       </p:ext>
     </p:extLst>
   </p:cSld>
@@ -3796,7 +3796,7 @@
           <a:p>
             <a:fld id="{E1A07225-5EC2-4FE8-BBD7-4A2ABB88F5AE}" type="datetimeFigureOut">
               <a:rPr lang="de-DE" smtClean="0"/>
-              <a:t>29.04.2022</a:t>
+              <a:t>05.05.2022</a:t>
             </a:fld>
             <a:endParaRPr lang="de-DE" dirty="0"/>
           </a:p>
@@ -3847,7 +3847,7 @@
     </p:spTree>
     <p:extLst>
       <p:ext uri="{BB962C8B-B14F-4D97-AF65-F5344CB8AC3E}">
-        <p14:creationId xmlns:p14="http://schemas.microsoft.com/office/powerpoint/2010/main" val="2093543209"/>
+        <p14:creationId xmlns:p14="http://schemas.microsoft.com/office/powerpoint/2010/main" val="2679478882"/>
       </p:ext>
     </p:extLst>
   </p:cSld>
@@ -3891,7 +3891,7 @@
           <a:p>
             <a:fld id="{E1A07225-5EC2-4FE8-BBD7-4A2ABB88F5AE}" type="datetimeFigureOut">
               <a:rPr lang="de-DE" smtClean="0"/>
-              <a:t>29.04.2022</a:t>
+              <a:t>05.05.2022</a:t>
             </a:fld>
             <a:endParaRPr lang="de-DE" dirty="0"/>
           </a:p>
@@ -3942,7 +3942,7 @@
     </p:spTree>
     <p:extLst>
       <p:ext uri="{BB962C8B-B14F-4D97-AF65-F5344CB8AC3E}">
-        <p14:creationId xmlns:p14="http://schemas.microsoft.com/office/powerpoint/2010/main" val="606102999"/>
+        <p14:creationId xmlns:p14="http://schemas.microsoft.com/office/powerpoint/2010/main" val="3427483725"/>
       </p:ext>
     </p:extLst>
   </p:cSld>
@@ -3981,8 +3981,8 @@
         </p:nvSpPr>
         <p:spPr>
           <a:xfrm>
-            <a:off x="7085012" y="685800"/>
-            <a:ext cx="3657600" cy="1371600"/>
+            <a:off x="7561036" y="731520"/>
+            <a:ext cx="3903345" cy="1463040"/>
           </a:xfrm>
         </p:spPr>
         <p:txBody>
@@ -3991,7 +3991,7 @@
           </a:bodyPr>
           <a:lstStyle>
             <a:lvl1pPr algn="l">
-              <a:defRPr sz="2400" b="0"/>
+              <a:defRPr sz="2560" b="0"/>
             </a:lvl1pPr>
           </a:lstStyle>
           <a:p>
@@ -4015,8 +4015,8 @@
         </p:nvSpPr>
         <p:spPr>
           <a:xfrm>
-            <a:off x="684212" y="685800"/>
-            <a:ext cx="5943601" cy="5308600"/>
+            <a:off x="730183" y="731520"/>
+            <a:ext cx="6342937" cy="5662507"/>
           </a:xfrm>
         </p:spPr>
         <p:txBody>
@@ -4074,8 +4074,8 @@
         </p:nvSpPr>
         <p:spPr>
           <a:xfrm>
-            <a:off x="7085012" y="2209799"/>
-            <a:ext cx="3657600" cy="2091267"/>
+            <a:off x="7561036" y="2357119"/>
+            <a:ext cx="3903345" cy="2230685"/>
           </a:xfrm>
         </p:spPr>
         <p:txBody>
@@ -4085,39 +4085,39 @@
           <a:lstStyle>
             <a:lvl1pPr marL="0" indent="0">
               <a:buNone/>
-              <a:defRPr sz="1600"/>
+              <a:defRPr sz="1707"/>
             </a:lvl1pPr>
-            <a:lvl2pPr marL="457200" indent="0">
-              <a:buNone/>
-              <a:defRPr sz="1200"/>
+            <a:lvl2pPr marL="487695" indent="0">
+              <a:buNone/>
+              <a:defRPr sz="1280"/>
             </a:lvl2pPr>
-            <a:lvl3pPr marL="914400" indent="0">
-              <a:buNone/>
-              <a:defRPr sz="1000"/>
+            <a:lvl3pPr marL="975390" indent="0">
+              <a:buNone/>
+              <a:defRPr sz="1067"/>
             </a:lvl3pPr>
-            <a:lvl4pPr marL="1371600" indent="0">
-              <a:buNone/>
-              <a:defRPr sz="900"/>
+            <a:lvl4pPr marL="1463086" indent="0">
+              <a:buNone/>
+              <a:defRPr sz="960"/>
             </a:lvl4pPr>
-            <a:lvl5pPr marL="1828800" indent="0">
-              <a:buNone/>
-              <a:defRPr sz="900"/>
+            <a:lvl5pPr marL="1950781" indent="0">
+              <a:buNone/>
+              <a:defRPr sz="960"/>
             </a:lvl5pPr>
-            <a:lvl6pPr marL="2286000" indent="0">
-              <a:buNone/>
-              <a:defRPr sz="900"/>
+            <a:lvl6pPr marL="2438476" indent="0">
+              <a:buNone/>
+              <a:defRPr sz="960"/>
             </a:lvl6pPr>
-            <a:lvl7pPr marL="2743200" indent="0">
-              <a:buNone/>
-              <a:defRPr sz="900"/>
+            <a:lvl7pPr marL="2926171" indent="0">
+              <a:buNone/>
+              <a:defRPr sz="960"/>
             </a:lvl7pPr>
-            <a:lvl8pPr marL="3200400" indent="0">
-              <a:buNone/>
-              <a:defRPr sz="900"/>
+            <a:lvl8pPr marL="3413867" indent="0">
+              <a:buNone/>
+              <a:defRPr sz="960"/>
             </a:lvl8pPr>
-            <a:lvl9pPr marL="3657600" indent="0">
-              <a:buNone/>
-              <a:defRPr sz="900"/>
+            <a:lvl9pPr marL="3901562" indent="0">
+              <a:buNone/>
+              <a:defRPr sz="960"/>
             </a:lvl9pPr>
           </a:lstStyle>
           <a:p>
@@ -4146,7 +4146,7 @@
           <a:p>
             <a:fld id="{E1A07225-5EC2-4FE8-BBD7-4A2ABB88F5AE}" type="datetimeFigureOut">
               <a:rPr lang="de-DE" smtClean="0"/>
-              <a:t>29.04.2022</a:t>
+              <a:t>05.05.2022</a:t>
             </a:fld>
             <a:endParaRPr lang="de-DE" dirty="0"/>
           </a:p>
@@ -4197,7 +4197,7 @@
     </p:spTree>
     <p:extLst>
       <p:ext uri="{BB962C8B-B14F-4D97-AF65-F5344CB8AC3E}">
-        <p14:creationId xmlns:p14="http://schemas.microsoft.com/office/powerpoint/2010/main" val="3094132393"/>
+        <p14:creationId xmlns:p14="http://schemas.microsoft.com/office/powerpoint/2010/main" val="2972216729"/>
       </p:ext>
     </p:extLst>
   </p:cSld>
@@ -4236,8 +4236,8 @@
         </p:nvSpPr>
         <p:spPr>
           <a:xfrm>
-            <a:off x="4722812" y="1447800"/>
-            <a:ext cx="6019800" cy="1143000"/>
+            <a:off x="5040126" y="1544320"/>
+            <a:ext cx="6424255" cy="1219200"/>
           </a:xfrm>
         </p:spPr>
         <p:txBody>
@@ -4246,7 +4246,7 @@
           </a:bodyPr>
           <a:lstStyle>
             <a:lvl1pPr algn="l">
-              <a:defRPr sz="2800" b="0"/>
+              <a:defRPr sz="2987" b="0"/>
             </a:lvl1pPr>
           </a:lstStyle>
           <a:p>
@@ -4270,8 +4270,8 @@
         </p:nvSpPr>
         <p:spPr>
           <a:xfrm>
-            <a:off x="989012" y="914400"/>
-            <a:ext cx="3280974" cy="4572000"/>
+            <a:off x="1055461" y="975360"/>
+            <a:ext cx="3501414" cy="4876800"/>
           </a:xfrm>
           <a:prstGeom prst="snip2DiagRect">
             <a:avLst>
@@ -4301,39 +4301,39 @@
           <a:lstStyle>
             <a:lvl1pPr marL="0" indent="0" algn="ctr">
               <a:buNone/>
-              <a:defRPr sz="1600"/>
+              <a:defRPr sz="1707"/>
             </a:lvl1pPr>
-            <a:lvl2pPr marL="457200" indent="0">
-              <a:buNone/>
-              <a:defRPr sz="1600"/>
+            <a:lvl2pPr marL="487695" indent="0">
+              <a:buNone/>
+              <a:defRPr sz="1707"/>
             </a:lvl2pPr>
-            <a:lvl3pPr marL="914400" indent="0">
-              <a:buNone/>
-              <a:defRPr sz="1600"/>
+            <a:lvl3pPr marL="975390" indent="0">
+              <a:buNone/>
+              <a:defRPr sz="1707"/>
             </a:lvl3pPr>
-            <a:lvl4pPr marL="1371600" indent="0">
-              <a:buNone/>
-              <a:defRPr sz="1600"/>
+            <a:lvl4pPr marL="1463086" indent="0">
+              <a:buNone/>
+              <a:defRPr sz="1707"/>
             </a:lvl4pPr>
-            <a:lvl5pPr marL="1828800" indent="0">
-              <a:buNone/>
-              <a:defRPr sz="1600"/>
+            <a:lvl5pPr marL="1950781" indent="0">
+              <a:buNone/>
+              <a:defRPr sz="1707"/>
             </a:lvl5pPr>
-            <a:lvl6pPr marL="2286000" indent="0">
-              <a:buNone/>
-              <a:defRPr sz="1600"/>
+            <a:lvl6pPr marL="2438476" indent="0">
+              <a:buNone/>
+              <a:defRPr sz="1707"/>
             </a:lvl6pPr>
-            <a:lvl7pPr marL="2743200" indent="0">
-              <a:buNone/>
-              <a:defRPr sz="1600"/>
+            <a:lvl7pPr marL="2926171" indent="0">
+              <a:buNone/>
+              <a:defRPr sz="1707"/>
             </a:lvl7pPr>
-            <a:lvl8pPr marL="3200400" indent="0">
-              <a:buNone/>
-              <a:defRPr sz="1600"/>
+            <a:lvl8pPr marL="3413867" indent="0">
+              <a:buNone/>
+              <a:defRPr sz="1707"/>
             </a:lvl8pPr>
-            <a:lvl9pPr marL="3657600" indent="0">
-              <a:buNone/>
-              <a:defRPr sz="1600"/>
+            <a:lvl9pPr marL="3901562" indent="0">
+              <a:buNone/>
+              <a:defRPr sz="1707"/>
             </a:lvl9pPr>
           </a:lstStyle>
           <a:p>
@@ -4357,8 +4357,8 @@
         </p:nvSpPr>
         <p:spPr>
           <a:xfrm>
-            <a:off x="4722812" y="2777066"/>
-            <a:ext cx="6021388" cy="2048933"/>
+            <a:off x="5040126" y="2962204"/>
+            <a:ext cx="6425950" cy="2185529"/>
           </a:xfrm>
         </p:spPr>
         <p:txBody>
@@ -4368,39 +4368,39 @@
           <a:lstStyle>
             <a:lvl1pPr marL="0" indent="0">
               <a:buNone/>
-              <a:defRPr sz="1800"/>
+              <a:defRPr sz="1920"/>
             </a:lvl1pPr>
-            <a:lvl2pPr marL="457200" indent="0">
-              <a:buNone/>
-              <a:defRPr sz="1200"/>
+            <a:lvl2pPr marL="487695" indent="0">
+              <a:buNone/>
+              <a:defRPr sz="1280"/>
             </a:lvl2pPr>
-            <a:lvl3pPr marL="914400" indent="0">
-              <a:buNone/>
-              <a:defRPr sz="1000"/>
+            <a:lvl3pPr marL="975390" indent="0">
+              <a:buNone/>
+              <a:defRPr sz="1067"/>
             </a:lvl3pPr>
-            <a:lvl4pPr marL="1371600" indent="0">
-              <a:buNone/>
-              <a:defRPr sz="900"/>
+            <a:lvl4pPr marL="1463086" indent="0">
+              <a:buNone/>
+              <a:defRPr sz="960"/>
             </a:lvl4pPr>
-            <a:lvl5pPr marL="1828800" indent="0">
-              <a:buNone/>
-              <a:defRPr sz="900"/>
+            <a:lvl5pPr marL="1950781" indent="0">
+              <a:buNone/>
+              <a:defRPr sz="960"/>
             </a:lvl5pPr>
-            <a:lvl6pPr marL="2286000" indent="0">
-              <a:buNone/>
-              <a:defRPr sz="900"/>
+            <a:lvl6pPr marL="2438476" indent="0">
+              <a:buNone/>
+              <a:defRPr sz="960"/>
             </a:lvl6pPr>
-            <a:lvl7pPr marL="2743200" indent="0">
-              <a:buNone/>
-              <a:defRPr sz="900"/>
+            <a:lvl7pPr marL="2926171" indent="0">
+              <a:buNone/>
+              <a:defRPr sz="960"/>
             </a:lvl7pPr>
-            <a:lvl8pPr marL="3200400" indent="0">
-              <a:buNone/>
-              <a:defRPr sz="900"/>
+            <a:lvl8pPr marL="3413867" indent="0">
+              <a:buNone/>
+              <a:defRPr sz="960"/>
             </a:lvl8pPr>
-            <a:lvl9pPr marL="3657600" indent="0">
-              <a:buNone/>
-              <a:defRPr sz="900"/>
+            <a:lvl9pPr marL="3901562" indent="0">
+              <a:buNone/>
+              <a:defRPr sz="960"/>
             </a:lvl9pPr>
           </a:lstStyle>
           <a:p>
@@ -4429,7 +4429,7 @@
           <a:p>
             <a:fld id="{E1A07225-5EC2-4FE8-BBD7-4A2ABB88F5AE}" type="datetimeFigureOut">
               <a:rPr lang="de-DE" smtClean="0"/>
-              <a:t>29.04.2022</a:t>
+              <a:t>05.05.2022</a:t>
             </a:fld>
             <a:endParaRPr lang="de-DE" dirty="0"/>
           </a:p>
@@ -4480,7 +4480,7 @@
     </p:spTree>
     <p:extLst>
       <p:ext uri="{BB962C8B-B14F-4D97-AF65-F5344CB8AC3E}">
-        <p14:creationId xmlns:p14="http://schemas.microsoft.com/office/powerpoint/2010/main" val="983392182"/>
+        <p14:creationId xmlns:p14="http://schemas.microsoft.com/office/powerpoint/2010/main" val="4175072234"/>
       </p:ext>
     </p:extLst>
   </p:cSld>
@@ -4520,8 +4520,8 @@
         </p:nvGrpSpPr>
         <p:grpSpPr>
           <a:xfrm>
-            <a:off x="9206969" y="2963333"/>
-            <a:ext cx="2981858" cy="3208867"/>
+            <a:off x="9825562" y="3160889"/>
+            <a:ext cx="3182202" cy="3422791"/>
             <a:chOff x="9206969" y="2963333"/>
             <a:chExt cx="2981858" cy="3208867"/>
           </a:xfrm>
@@ -4714,8 +4714,8 @@
         </p:nvSpPr>
         <p:spPr>
           <a:xfrm>
-            <a:off x="684212" y="4487332"/>
-            <a:ext cx="8534400" cy="1507067"/>
+            <a:off x="730182" y="4786488"/>
+            <a:ext cx="9107805" cy="1607538"/>
           </a:xfrm>
           <a:prstGeom prst="rect">
             <a:avLst/>
@@ -4748,8 +4748,8 @@
         </p:nvSpPr>
         <p:spPr>
           <a:xfrm>
-            <a:off x="684212" y="685800"/>
-            <a:ext cx="8534400" cy="3615267"/>
+            <a:off x="730182" y="731520"/>
+            <a:ext cx="9107805" cy="3856285"/>
           </a:xfrm>
           <a:prstGeom prst="rect">
             <a:avLst/>
@@ -4810,8 +4810,8 @@
         </p:nvSpPr>
         <p:spPr>
           <a:xfrm>
-            <a:off x="9904412" y="6172200"/>
-            <a:ext cx="1600200" cy="365125"/>
+            <a:off x="10569865" y="6583680"/>
+            <a:ext cx="1707713" cy="389467"/>
           </a:xfrm>
           <a:prstGeom prst="rect">
             <a:avLst/>
@@ -4821,7 +4821,7 @@
           <a:bodyPr vert="horz" lIns="91440" tIns="45720" rIns="91440" bIns="45720" rtlCol="0" anchor="t"/>
           <a:lstStyle>
             <a:lvl1pPr algn="r">
-              <a:defRPr sz="1000" b="0" i="0">
+              <a:defRPr sz="1067" b="0" i="0">
                 <a:solidFill>
                   <a:schemeClr val="bg2">
                     <a:lumMod val="50000"/>
@@ -4835,7 +4835,7 @@
           <a:p>
             <a:fld id="{E1A07225-5EC2-4FE8-BBD7-4A2ABB88F5AE}" type="datetimeFigureOut">
               <a:rPr lang="de-DE" smtClean="0"/>
-              <a:t>29.04.2022</a:t>
+              <a:t>05.05.2022</a:t>
             </a:fld>
             <a:endParaRPr lang="de-DE" dirty="0"/>
           </a:p>
@@ -4853,8 +4853,8 @@
         </p:nvSpPr>
         <p:spPr>
           <a:xfrm>
-            <a:off x="684212" y="6172200"/>
-            <a:ext cx="7543800" cy="365125"/>
+            <a:off x="730183" y="6583680"/>
+            <a:ext cx="8050649" cy="389467"/>
           </a:xfrm>
           <a:prstGeom prst="rect">
             <a:avLst/>
@@ -4864,7 +4864,7 @@
           <a:bodyPr vert="horz" lIns="91440" tIns="45720" rIns="91440" bIns="45720" rtlCol="0" anchor="t"/>
           <a:lstStyle>
             <a:lvl1pPr algn="l">
-              <a:defRPr sz="1000" b="0" i="0">
+              <a:defRPr sz="1067" b="0" i="0">
                 <a:solidFill>
                   <a:schemeClr val="bg2">
                     <a:lumMod val="50000"/>
@@ -4892,8 +4892,8 @@
         </p:nvSpPr>
         <p:spPr>
           <a:xfrm>
-            <a:off x="10363200" y="5578475"/>
-            <a:ext cx="1142245" cy="669925"/>
+            <a:off x="11059478" y="5950374"/>
+            <a:ext cx="1218990" cy="714587"/>
           </a:xfrm>
           <a:prstGeom prst="rect">
             <a:avLst/>
@@ -4903,7 +4903,7 @@
           <a:bodyPr vert="horz" lIns="91440" tIns="45720" rIns="91440" bIns="45720" rtlCol="0" anchor="b"/>
           <a:lstStyle>
             <a:lvl1pPr algn="r">
-              <a:defRPr sz="3200" b="0" i="0">
+              <a:defRPr sz="3413" b="0" i="0">
                 <a:solidFill>
                   <a:schemeClr val="bg2">
                     <a:lumMod val="50000"/>
@@ -4926,38 +4926,38 @@
     </p:spTree>
     <p:extLst>
       <p:ext uri="{BB962C8B-B14F-4D97-AF65-F5344CB8AC3E}">
-        <p14:creationId xmlns:p14="http://schemas.microsoft.com/office/powerpoint/2010/main" val="3311451449"/>
+        <p14:creationId xmlns:p14="http://schemas.microsoft.com/office/powerpoint/2010/main" val="1421600090"/>
       </p:ext>
     </p:extLst>
   </p:cSld>
   <p:clrMap bg1="dk1" tx1="lt1" bg2="dk2" tx2="lt2" accent1="accent1" accent2="accent2" accent3="accent3" accent4="accent4" accent5="accent5" accent6="accent6" hlink="hlink" folHlink="folHlink"/>
   <p:sldLayoutIdLst>
-    <p:sldLayoutId id="2147483673" r:id="rId1"/>
-    <p:sldLayoutId id="2147483674" r:id="rId2"/>
-    <p:sldLayoutId id="2147483675" r:id="rId3"/>
-    <p:sldLayoutId id="2147483676" r:id="rId4"/>
-    <p:sldLayoutId id="2147483677" r:id="rId5"/>
-    <p:sldLayoutId id="2147483678" r:id="rId6"/>
-    <p:sldLayoutId id="2147483679" r:id="rId7"/>
-    <p:sldLayoutId id="2147483680" r:id="rId8"/>
-    <p:sldLayoutId id="2147483681" r:id="rId9"/>
-    <p:sldLayoutId id="2147483682" r:id="rId10"/>
-    <p:sldLayoutId id="2147483683" r:id="rId11"/>
-    <p:sldLayoutId id="2147483684" r:id="rId12"/>
-    <p:sldLayoutId id="2147483685" r:id="rId13"/>
-    <p:sldLayoutId id="2147483686" r:id="rId14"/>
-    <p:sldLayoutId id="2147483687" r:id="rId15"/>
-    <p:sldLayoutId id="2147483688" r:id="rId16"/>
-    <p:sldLayoutId id="2147483689" r:id="rId17"/>
+    <p:sldLayoutId id="2147483691" r:id="rId1"/>
+    <p:sldLayoutId id="2147483692" r:id="rId2"/>
+    <p:sldLayoutId id="2147483693" r:id="rId3"/>
+    <p:sldLayoutId id="2147483694" r:id="rId4"/>
+    <p:sldLayoutId id="2147483695" r:id="rId5"/>
+    <p:sldLayoutId id="2147483696" r:id="rId6"/>
+    <p:sldLayoutId id="2147483697" r:id="rId7"/>
+    <p:sldLayoutId id="2147483698" r:id="rId8"/>
+    <p:sldLayoutId id="2147483699" r:id="rId9"/>
+    <p:sldLayoutId id="2147483700" r:id="rId10"/>
+    <p:sldLayoutId id="2147483701" r:id="rId11"/>
+    <p:sldLayoutId id="2147483702" r:id="rId12"/>
+    <p:sldLayoutId id="2147483703" r:id="rId13"/>
+    <p:sldLayoutId id="2147483704" r:id="rId14"/>
+    <p:sldLayoutId id="2147483705" r:id="rId15"/>
+    <p:sldLayoutId id="2147483706" r:id="rId16"/>
+    <p:sldLayoutId id="2147483707" r:id="rId17"/>
   </p:sldLayoutIdLst>
   <p:txStyles>
     <p:titleStyle>
-      <a:lvl1pPr algn="l" defTabSz="457200" rtl="0" eaLnBrk="1" latinLnBrk="0" hangingPunct="1">
+      <a:lvl1pPr algn="l" defTabSz="487695" rtl="0" eaLnBrk="1" latinLnBrk="0" hangingPunct="1">
         <a:spcBef>
           <a:spcPct val="0"/>
         </a:spcBef>
         <a:buNone/>
-        <a:defRPr sz="3600" kern="1200" cap="all">
+        <a:defRPr sz="3840" kern="1200" cap="all">
           <a:ln w="3175" cmpd="sng">
             <a:noFill/>
           </a:ln>
@@ -5028,12 +5028,12 @@
       </a:lvl9pPr>
     </p:titleStyle>
     <p:bodyStyle>
-      <a:lvl1pPr marL="285750" indent="-285750" algn="l" defTabSz="457200" rtl="0" eaLnBrk="1" latinLnBrk="0" hangingPunct="1">
+      <a:lvl1pPr marL="304810" indent="-304810" algn="l" defTabSz="487695" rtl="0" eaLnBrk="1" latinLnBrk="0" hangingPunct="1">
         <a:spcBef>
           <a:spcPct val="20000"/>
         </a:spcBef>
         <a:spcAft>
-          <a:spcPts val="600"/>
+          <a:spcPts val="640"/>
         </a:spcAft>
         <a:buClr>
           <a:schemeClr val="tx1"/>
@@ -5041,7 +5041,7 @@
         <a:buSzPct val="80000"/>
         <a:buFont typeface="Wingdings 3" panose="05040102010807070707" pitchFamily="18" charset="2"/>
         <a:buChar char=""/>
-        <a:defRPr sz="2000" kern="1200" cap="none">
+        <a:defRPr sz="2133" kern="1200" cap="none">
           <a:solidFill>
             <a:schemeClr val="bg2">
               <a:lumMod val="75000"/>
@@ -5053,12 +5053,12 @@
           <a:cs typeface="+mn-cs"/>
         </a:defRPr>
       </a:lvl1pPr>
-      <a:lvl2pPr marL="742950" indent="-285750" algn="l" defTabSz="457200" rtl="0" eaLnBrk="1" latinLnBrk="0" hangingPunct="1">
+      <a:lvl2pPr marL="792505" indent="-304810" algn="l" defTabSz="487695" rtl="0" eaLnBrk="1" latinLnBrk="0" hangingPunct="1">
         <a:spcBef>
           <a:spcPct val="20000"/>
         </a:spcBef>
         <a:spcAft>
-          <a:spcPts val="600"/>
+          <a:spcPts val="640"/>
         </a:spcAft>
         <a:buClr>
           <a:schemeClr val="tx1"/>
@@ -5066,7 +5066,7 @@
         <a:buSzPct val="80000"/>
         <a:buFont typeface="Wingdings 3" panose="05040102010807070707" pitchFamily="18" charset="2"/>
         <a:buChar char=""/>
-        <a:defRPr sz="1800" kern="1200" cap="none">
+        <a:defRPr sz="1920" kern="1200" cap="none">
           <a:solidFill>
             <a:schemeClr val="bg2">
               <a:lumMod val="75000"/>
@@ -5078,12 +5078,12 @@
           <a:cs typeface="+mn-cs"/>
         </a:defRPr>
       </a:lvl2pPr>
-      <a:lvl3pPr marL="1200150" indent="-285750" algn="l" defTabSz="457200" rtl="0" eaLnBrk="1" latinLnBrk="0" hangingPunct="1">
+      <a:lvl3pPr marL="1280200" indent="-304810" algn="l" defTabSz="487695" rtl="0" eaLnBrk="1" latinLnBrk="0" hangingPunct="1">
         <a:spcBef>
           <a:spcPct val="20000"/>
         </a:spcBef>
         <a:spcAft>
-          <a:spcPts val="600"/>
+          <a:spcPts val="640"/>
         </a:spcAft>
         <a:buClr>
           <a:schemeClr val="tx1"/>
@@ -5091,7 +5091,7 @@
         <a:buSzPct val="80000"/>
         <a:buFont typeface="Wingdings 3" panose="05040102010807070707" pitchFamily="18" charset="2"/>
         <a:buChar char=""/>
-        <a:defRPr sz="1600" kern="1200" cap="none">
+        <a:defRPr sz="1707" kern="1200" cap="none">
           <a:solidFill>
             <a:schemeClr val="bg2">
               <a:lumMod val="75000"/>
@@ -5103,12 +5103,12 @@
           <a:cs typeface="+mn-cs"/>
         </a:defRPr>
       </a:lvl3pPr>
-      <a:lvl4pPr marL="1543050" indent="-171450" algn="l" defTabSz="457200" rtl="0" eaLnBrk="1" latinLnBrk="0" hangingPunct="1">
+      <a:lvl4pPr marL="1645971" indent="-182886" algn="l" defTabSz="487695" rtl="0" eaLnBrk="1" latinLnBrk="0" hangingPunct="1">
         <a:spcBef>
           <a:spcPct val="20000"/>
         </a:spcBef>
         <a:spcAft>
-          <a:spcPts val="600"/>
+          <a:spcPts val="640"/>
         </a:spcAft>
         <a:buClr>
           <a:schemeClr val="tx1"/>
@@ -5116,7 +5116,7 @@
         <a:buSzPct val="80000"/>
         <a:buFont typeface="Wingdings 3" panose="05040102010807070707" pitchFamily="18" charset="2"/>
         <a:buChar char=""/>
-        <a:defRPr sz="1400" kern="1200" cap="none">
+        <a:defRPr sz="1493" kern="1200" cap="none">
           <a:solidFill>
             <a:schemeClr val="bg2">
               <a:lumMod val="75000"/>
@@ -5128,12 +5128,12 @@
           <a:cs typeface="+mn-cs"/>
         </a:defRPr>
       </a:lvl4pPr>
-      <a:lvl5pPr marL="2000250" indent="-171450" algn="l" defTabSz="457200" rtl="0" eaLnBrk="1" latinLnBrk="0" hangingPunct="1">
+      <a:lvl5pPr marL="2133667" indent="-182886" algn="l" defTabSz="487695" rtl="0" eaLnBrk="1" latinLnBrk="0" hangingPunct="1">
         <a:spcBef>
           <a:spcPct val="20000"/>
         </a:spcBef>
         <a:spcAft>
-          <a:spcPts val="600"/>
+          <a:spcPts val="640"/>
         </a:spcAft>
         <a:buClr>
           <a:schemeClr val="tx1"/>
@@ -5141,7 +5141,7 @@
         <a:buSzPct val="80000"/>
         <a:buFont typeface="Wingdings 3" panose="05040102010807070707" pitchFamily="18" charset="2"/>
         <a:buChar char=""/>
-        <a:defRPr sz="1400" kern="1200" cap="none">
+        <a:defRPr sz="1493" kern="1200" cap="none">
           <a:solidFill>
             <a:schemeClr val="bg2">
               <a:lumMod val="75000"/>
@@ -5153,12 +5153,12 @@
           <a:cs typeface="+mn-cs"/>
         </a:defRPr>
       </a:lvl5pPr>
-      <a:lvl6pPr marL="2514600" indent="-228600" algn="l" defTabSz="457200" rtl="0" eaLnBrk="1" latinLnBrk="0" hangingPunct="1">
+      <a:lvl6pPr marL="2682324" indent="-243848" algn="l" defTabSz="487695" rtl="0" eaLnBrk="1" latinLnBrk="0" hangingPunct="1">
         <a:spcBef>
           <a:spcPct val="20000"/>
         </a:spcBef>
         <a:spcAft>
-          <a:spcPts val="600"/>
+          <a:spcPts val="640"/>
         </a:spcAft>
         <a:buClr>
           <a:schemeClr val="tx1"/>
@@ -5166,7 +5166,7 @@
         <a:buSzPct val="80000"/>
         <a:buFont typeface="Wingdings 3" panose="05040102010807070707" pitchFamily="18" charset="2"/>
         <a:buChar char=""/>
-        <a:defRPr sz="1400" kern="1200" cap="none">
+        <a:defRPr sz="1493" kern="1200" cap="none">
           <a:solidFill>
             <a:schemeClr val="bg2">
               <a:lumMod val="75000"/>
@@ -5178,12 +5178,12 @@
           <a:cs typeface="+mn-cs"/>
         </a:defRPr>
       </a:lvl6pPr>
-      <a:lvl7pPr marL="2971800" indent="-228600" algn="l" defTabSz="457200" rtl="0" eaLnBrk="1" latinLnBrk="0" hangingPunct="1">
+      <a:lvl7pPr marL="3170019" indent="-243848" algn="l" defTabSz="487695" rtl="0" eaLnBrk="1" latinLnBrk="0" hangingPunct="1">
         <a:spcBef>
           <a:spcPct val="20000"/>
         </a:spcBef>
         <a:spcAft>
-          <a:spcPts val="600"/>
+          <a:spcPts val="640"/>
         </a:spcAft>
         <a:buClr>
           <a:schemeClr val="tx1"/>
@@ -5191,7 +5191,7 @@
         <a:buSzPct val="80000"/>
         <a:buFont typeface="Wingdings 3" panose="05040102010807070707" pitchFamily="18" charset="2"/>
         <a:buChar char=""/>
-        <a:defRPr sz="1400" kern="1200" cap="none">
+        <a:defRPr sz="1493" kern="1200" cap="none">
           <a:solidFill>
             <a:schemeClr val="bg2">
               <a:lumMod val="75000"/>
@@ -5203,12 +5203,12 @@
           <a:cs typeface="+mn-cs"/>
         </a:defRPr>
       </a:lvl7pPr>
-      <a:lvl8pPr marL="3429000" indent="-228600" algn="l" defTabSz="457200" rtl="0" eaLnBrk="1" latinLnBrk="0" hangingPunct="1">
+      <a:lvl8pPr marL="3657714" indent="-243848" algn="l" defTabSz="487695" rtl="0" eaLnBrk="1" latinLnBrk="0" hangingPunct="1">
         <a:spcBef>
           <a:spcPct val="20000"/>
         </a:spcBef>
         <a:spcAft>
-          <a:spcPts val="600"/>
+          <a:spcPts val="640"/>
         </a:spcAft>
         <a:buClr>
           <a:schemeClr val="tx1"/>
@@ -5216,7 +5216,7 @@
         <a:buSzPct val="80000"/>
         <a:buFont typeface="Wingdings 3" panose="05040102010807070707" pitchFamily="18" charset="2"/>
         <a:buChar char=""/>
-        <a:defRPr sz="1400" kern="1200" cap="none">
+        <a:defRPr sz="1493" kern="1200" cap="none">
           <a:solidFill>
             <a:schemeClr val="bg2">
               <a:lumMod val="75000"/>
@@ -5228,12 +5228,12 @@
           <a:cs typeface="+mn-cs"/>
         </a:defRPr>
       </a:lvl8pPr>
-      <a:lvl9pPr marL="3886200" indent="-228600" algn="l" defTabSz="457200" rtl="0" eaLnBrk="1" latinLnBrk="0" hangingPunct="1">
+      <a:lvl9pPr marL="4145410" indent="-243848" algn="l" defTabSz="487695" rtl="0" eaLnBrk="1" latinLnBrk="0" hangingPunct="1">
         <a:spcBef>
           <a:spcPct val="20000"/>
         </a:spcBef>
         <a:spcAft>
-          <a:spcPts val="600"/>
+          <a:spcPts val="640"/>
         </a:spcAft>
         <a:buClr>
           <a:schemeClr val="tx1"/>
@@ -5241,7 +5241,7 @@
         <a:buSzPct val="80000"/>
         <a:buFont typeface="Wingdings 3" panose="05040102010807070707" pitchFamily="18" charset="2"/>
         <a:buChar char=""/>
-        <a:defRPr sz="1400" kern="1200" cap="none">
+        <a:defRPr sz="1493" kern="1200" cap="none">
           <a:solidFill>
             <a:schemeClr val="bg2">
               <a:lumMod val="75000"/>
@@ -5258,8 +5258,8 @@
       <a:defPPr>
         <a:defRPr lang="en-US"/>
       </a:defPPr>
-      <a:lvl1pPr marL="0" algn="l" defTabSz="457200" rtl="0" eaLnBrk="1" latinLnBrk="0" hangingPunct="1">
-        <a:defRPr sz="1800" kern="1200">
+      <a:lvl1pPr marL="0" algn="l" defTabSz="487695" rtl="0" eaLnBrk="1" latinLnBrk="0" hangingPunct="1">
+        <a:defRPr sz="1920" kern="1200">
           <a:solidFill>
             <a:schemeClr val="tx1"/>
           </a:solidFill>
@@ -5268,8 +5268,8 @@
           <a:cs typeface="+mn-cs"/>
         </a:defRPr>
       </a:lvl1pPr>
-      <a:lvl2pPr marL="457200" algn="l" defTabSz="457200" rtl="0" eaLnBrk="1" latinLnBrk="0" hangingPunct="1">
-        <a:defRPr sz="1800" kern="1200">
+      <a:lvl2pPr marL="487695" algn="l" defTabSz="487695" rtl="0" eaLnBrk="1" latinLnBrk="0" hangingPunct="1">
+        <a:defRPr sz="1920" kern="1200">
           <a:solidFill>
             <a:schemeClr val="tx1"/>
           </a:solidFill>
@@ -5278,8 +5278,8 @@
           <a:cs typeface="+mn-cs"/>
         </a:defRPr>
       </a:lvl2pPr>
-      <a:lvl3pPr marL="914400" algn="l" defTabSz="457200" rtl="0" eaLnBrk="1" latinLnBrk="0" hangingPunct="1">
-        <a:defRPr sz="1800" kern="1200">
+      <a:lvl3pPr marL="975390" algn="l" defTabSz="487695" rtl="0" eaLnBrk="1" latinLnBrk="0" hangingPunct="1">
+        <a:defRPr sz="1920" kern="1200">
           <a:solidFill>
             <a:schemeClr val="tx1"/>
           </a:solidFill>
@@ -5288,8 +5288,8 @@
           <a:cs typeface="+mn-cs"/>
         </a:defRPr>
       </a:lvl3pPr>
-      <a:lvl4pPr marL="1371600" algn="l" defTabSz="457200" rtl="0" eaLnBrk="1" latinLnBrk="0" hangingPunct="1">
-        <a:defRPr sz="1800" kern="1200">
+      <a:lvl4pPr marL="1463086" algn="l" defTabSz="487695" rtl="0" eaLnBrk="1" latinLnBrk="0" hangingPunct="1">
+        <a:defRPr sz="1920" kern="1200">
           <a:solidFill>
             <a:schemeClr val="tx1"/>
           </a:solidFill>
@@ -5298,8 +5298,8 @@
           <a:cs typeface="+mn-cs"/>
         </a:defRPr>
       </a:lvl4pPr>
-      <a:lvl5pPr marL="1828800" algn="l" defTabSz="457200" rtl="0" eaLnBrk="1" latinLnBrk="0" hangingPunct="1">
-        <a:defRPr sz="1800" kern="1200">
+      <a:lvl5pPr marL="1950781" algn="l" defTabSz="487695" rtl="0" eaLnBrk="1" latinLnBrk="0" hangingPunct="1">
+        <a:defRPr sz="1920" kern="1200">
           <a:solidFill>
             <a:schemeClr val="tx1"/>
           </a:solidFill>
@@ -5308,8 +5308,8 @@
           <a:cs typeface="+mn-cs"/>
         </a:defRPr>
       </a:lvl5pPr>
-      <a:lvl6pPr marL="2286000" algn="l" defTabSz="457200" rtl="0" eaLnBrk="1" latinLnBrk="0" hangingPunct="1">
-        <a:defRPr sz="1800" kern="1200">
+      <a:lvl6pPr marL="2438476" algn="l" defTabSz="487695" rtl="0" eaLnBrk="1" latinLnBrk="0" hangingPunct="1">
+        <a:defRPr sz="1920" kern="1200">
           <a:solidFill>
             <a:schemeClr val="tx1"/>
           </a:solidFill>
@@ -5318,8 +5318,8 @@
           <a:cs typeface="+mn-cs"/>
         </a:defRPr>
       </a:lvl6pPr>
-      <a:lvl7pPr marL="2743200" algn="l" defTabSz="457200" rtl="0" eaLnBrk="1" latinLnBrk="0" hangingPunct="1">
-        <a:defRPr sz="1800" kern="1200">
+      <a:lvl7pPr marL="2926171" algn="l" defTabSz="487695" rtl="0" eaLnBrk="1" latinLnBrk="0" hangingPunct="1">
+        <a:defRPr sz="1920" kern="1200">
           <a:solidFill>
             <a:schemeClr val="tx1"/>
           </a:solidFill>
@@ -5328,8 +5328,8 @@
           <a:cs typeface="+mn-cs"/>
         </a:defRPr>
       </a:lvl7pPr>
-      <a:lvl8pPr marL="3200400" algn="l" defTabSz="457200" rtl="0" eaLnBrk="1" latinLnBrk="0" hangingPunct="1">
-        <a:defRPr sz="1800" kern="1200">
+      <a:lvl8pPr marL="3413867" algn="l" defTabSz="487695" rtl="0" eaLnBrk="1" latinLnBrk="0" hangingPunct="1">
+        <a:defRPr sz="1920" kern="1200">
           <a:solidFill>
             <a:schemeClr val="tx1"/>
           </a:solidFill>
@@ -5338,8 +5338,8 @@
           <a:cs typeface="+mn-cs"/>
         </a:defRPr>
       </a:lvl8pPr>
-      <a:lvl9pPr marL="3657600" algn="l" defTabSz="457200" rtl="0" eaLnBrk="1" latinLnBrk="0" hangingPunct="1">
-        <a:defRPr sz="1800" kern="1200">
+      <a:lvl9pPr marL="3901562" algn="l" defTabSz="487695" rtl="0" eaLnBrk="1" latinLnBrk="0" hangingPunct="1">
+        <a:defRPr sz="1920" kern="1200">
           <a:solidFill>
             <a:schemeClr val="tx1"/>
           </a:solidFill>
@@ -5384,8 +5384,8 @@
         </p:nvSpPr>
         <p:spPr>
           <a:xfrm>
-            <a:off x="832207" y="657546"/>
-            <a:ext cx="5630644" cy="830997"/>
+            <a:off x="890863" y="701383"/>
+            <a:ext cx="6973384" cy="880241"/>
           </a:xfrm>
           <a:prstGeom prst="rect">
             <a:avLst/>
@@ -5399,7 +5399,7 @@
           <a:lstStyle/>
           <a:p>
             <a:r>
-              <a:rPr lang="de-DE" sz="4800" dirty="0"/>
+              <a:rPr lang="de-DE" sz="5120" dirty="0"/>
               <a:t>Summarize long mails</a:t>
             </a:r>
           </a:p>
@@ -5432,8 +5432,8 @@
         </p:blipFill>
         <p:spPr>
           <a:xfrm>
-            <a:off x="2315367" y="1880455"/>
-            <a:ext cx="7561266" cy="4319999"/>
+            <a:off x="2472900" y="2005819"/>
+            <a:ext cx="8065350" cy="4607999"/>
           </a:xfrm>
           <a:prstGeom prst="round2DiagRect">
             <a:avLst>
@@ -5500,8 +5500,8 @@
         </p:nvSpPr>
         <p:spPr>
           <a:xfrm>
-            <a:off x="832207" y="657546"/>
-            <a:ext cx="8166018" cy="830997"/>
+            <a:off x="890863" y="701383"/>
+            <a:ext cx="8701421" cy="880241"/>
           </a:xfrm>
           <a:prstGeom prst="rect">
             <a:avLst/>
@@ -5515,19 +5515,19 @@
           <a:lstStyle/>
           <a:p>
             <a:r>
-              <a:rPr lang="de-DE" sz="4800" dirty="0" err="1"/>
+              <a:rPr lang="de-DE" sz="5120" dirty="0" err="1"/>
               <a:t>Summarize</a:t>
             </a:r>
             <a:r>
-              <a:rPr lang="de-DE" sz="4800" dirty="0"/>
+              <a:rPr lang="de-DE" sz="5120" dirty="0"/>
               <a:t> </a:t>
             </a:r>
             <a:r>
-              <a:rPr lang="de-DE" sz="4800" dirty="0" err="1"/>
+              <a:rPr lang="de-DE" sz="5120" dirty="0" err="1"/>
               <a:t>discussion</a:t>
             </a:r>
             <a:r>
-              <a:rPr lang="de-DE" sz="4800" dirty="0"/>
+              <a:rPr lang="de-DE" sz="5120" dirty="0"/>
               <a:t> mails</a:t>
             </a:r>
           </a:p>
@@ -5560,8 +5560,8 @@
         </p:blipFill>
         <p:spPr>
           <a:xfrm>
-            <a:off x="2315367" y="1880455"/>
-            <a:ext cx="7561266" cy="4319999"/>
+            <a:off x="2472900" y="2005819"/>
+            <a:ext cx="8065350" cy="4607999"/>
           </a:xfrm>
           <a:prstGeom prst="round2DiagRect">
             <a:avLst>
@@ -5628,8 +5628,8 @@
         </p:nvSpPr>
         <p:spPr>
           <a:xfrm>
-            <a:off x="832207" y="657546"/>
-            <a:ext cx="6410729" cy="830997"/>
+            <a:off x="890863" y="701383"/>
+            <a:ext cx="6827510" cy="880241"/>
           </a:xfrm>
           <a:prstGeom prst="rect">
             <a:avLst/>
@@ -5643,18 +5643,18 @@
           <a:lstStyle/>
           <a:p>
             <a:r>
-              <a:rPr lang="de-DE" sz="4800" dirty="0" err="1"/>
+              <a:rPr lang="de-DE" sz="5120" dirty="0" err="1"/>
               <a:t>Recognize</a:t>
             </a:r>
             <a:r>
-              <a:rPr lang="de-DE" sz="4800" dirty="0"/>
+              <a:rPr lang="de-DE" sz="5120" dirty="0"/>
               <a:t> </a:t>
             </a:r>
             <a:r>
-              <a:rPr lang="de-DE" sz="4800"/>
+              <a:rPr lang="de-DE" sz="5120"/>
               <a:t>sentiment</a:t>
             </a:r>
-            <a:endParaRPr lang="de-DE" sz="4800" dirty="0"/>
+            <a:endParaRPr lang="de-DE" sz="5120" dirty="0"/>
           </a:p>
         </p:txBody>
       </p:sp>
@@ -5685,8 +5685,8 @@
         </p:blipFill>
         <p:spPr>
           <a:xfrm>
-            <a:off x="2315367" y="1880455"/>
-            <a:ext cx="7561266" cy="4319999"/>
+            <a:off x="2472900" y="2005819"/>
+            <a:ext cx="8065350" cy="4607999"/>
           </a:xfrm>
           <a:prstGeom prst="round2DiagRect">
             <a:avLst>

</xml_diff>